<commit_message>
Add QR code and shortened URL
</commit_message>
<xml_diff>
--- a/python_for_systems_programming.pptx
+++ b/python_for_systems_programming.pptx
@@ -7,7 +7,7 @@
   </p:sldMasterIdLst>
   <p:sldIdLst>
     <p:sldId id="256" r:id="rId3"/>
-    <p:sldId id="291" r:id="rId4"/>
+    <p:sldId id="292" r:id="rId4"/>
     <p:sldId id="290" r:id="rId5"/>
     <p:sldId id="289" r:id="rId6"/>
     <p:sldId id="257" r:id="rId7"/>
@@ -146,7 +146,7 @@
         <p14:section name="Default Section" id="{658EF463-8B9F-45F8-88CE-B4159E44B7D4}">
           <p14:sldIdLst>
             <p14:sldId id="256"/>
-            <p14:sldId id="291"/>
+            <p14:sldId id="292"/>
             <p14:sldId id="290"/>
             <p14:sldId id="289"/>
           </p14:sldIdLst>
@@ -10052,10 +10052,111 @@
           <a:chExt cx="0" cy="0"/>
         </a:xfrm>
       </p:grpSpPr>
+      <p:sp>
+        <p:nvSpPr>
+          <p:cNvPr id="4" name="Slide Number Placeholder 3"/>
+          <p:cNvSpPr>
+            <a:spLocks noGrp="1"/>
+          </p:cNvSpPr>
+          <p:nvPr>
+            <p:ph type="sldNum" sz="quarter" idx="12"/>
+          </p:nvPr>
+        </p:nvSpPr>
+        <p:spPr/>
+        <p:txBody>
+          <a:bodyPr/>
+          <a:lstStyle/>
+          <a:p>
+            <a:fld id="{0AA598EC-1C61-495B-A9F8-4410E339CCF5}" type="slidenum">
+              <a:rPr lang="en-US" smtClean="0"/>
+              <a:t>2</a:t>
+            </a:fld>
+            <a:endParaRPr lang="en-US"/>
+          </a:p>
+        </p:txBody>
+      </p:sp>
+      <p:sp>
+        <p:nvSpPr>
+          <p:cNvPr id="6" name="TextBox 5"/>
+          <p:cNvSpPr txBox="1"/>
+          <p:nvPr/>
+        </p:nvSpPr>
+        <p:spPr>
+          <a:xfrm>
+            <a:off x="3860836" y="5445224"/>
+            <a:ext cx="5034840" cy="707886"/>
+          </a:xfrm>
+          <a:prstGeom prst="rect">
+            <a:avLst/>
+          </a:prstGeom>
+          <a:noFill/>
+        </p:spPr>
+        <p:txBody>
+          <a:bodyPr wrap="none" rtlCol="0">
+            <a:spAutoFit/>
+          </a:bodyPr>
+          <a:lstStyle/>
+          <a:p>
+            <a:r>
+              <a:rPr lang="en-US" sz="4000" dirty="0" smtClean="0">
+                <a:hlinkClick r:id="rId2"/>
+              </a:rPr>
+              <a:t>http</a:t>
+            </a:r>
+            <a:r>
+              <a:rPr lang="en-US" sz="4000" dirty="0">
+                <a:hlinkClick r:id="rId2"/>
+              </a:rPr>
+              <a:t>://</a:t>
+            </a:r>
+            <a:r>
+              <a:rPr lang="en-US" sz="4000" dirty="0" smtClean="0">
+                <a:hlinkClick r:id="rId2"/>
+              </a:rPr>
+              <a:t>bit.ly/2QKwRLd</a:t>
+            </a:r>
+            <a:r>
+              <a:rPr lang="en-US" sz="4000" dirty="0" smtClean="0"/>
+              <a:t>  </a:t>
+            </a:r>
+            <a:endParaRPr lang="en-US" sz="4000" dirty="0"/>
+          </a:p>
+        </p:txBody>
+      </p:sp>
+      <p:pic>
+        <p:nvPicPr>
+          <p:cNvPr id="3" name="Picture 2"/>
+          <p:cNvPicPr>
+            <a:picLocks noChangeAspect="1"/>
+          </p:cNvPicPr>
+          <p:nvPr/>
+        </p:nvPicPr>
+        <p:blipFill>
+          <a:blip r:embed="rId3">
+            <a:extLst>
+              <a:ext uri="{28A0092B-C50C-407E-A947-70E740481C1C}">
+                <a14:useLocalDpi xmlns:a14="http://schemas.microsoft.com/office/drawing/2010/main" val="0"/>
+              </a:ext>
+            </a:extLst>
+          </a:blip>
+          <a:stretch>
+            <a:fillRect/>
+          </a:stretch>
+        </p:blipFill>
+        <p:spPr>
+          <a:xfrm>
+            <a:off x="3933652" y="980729"/>
+            <a:ext cx="4324696" cy="4324696"/>
+          </a:xfrm>
+          <a:prstGeom prst="rect">
+            <a:avLst/>
+          </a:prstGeom>
+        </p:spPr>
+      </p:pic>
     </p:spTree>
     <p:extLst>
       <p:ext uri="{BB962C8B-B14F-4D97-AF65-F5344CB8AC3E}">
-        <p14:creationId xmlns:p14="http://schemas.microsoft.com/office/powerpoint/2010/main" val="2924098077"/>
+        <p14:creationId xmlns:p14="http://schemas.microsoft.com/office/powerpoint/2010/main" val="376793401"/>
       </p:ext>
     </p:extLst>
   </p:cSld>

</xml_diff>

<commit_message>
Add slide on data formats
</commit_message>
<xml_diff>
--- a/python_for_systems_programming.pptx
+++ b/python_for_systems_programming.pptx
@@ -26,22 +26,23 @@
     <p:sldId id="270" r:id="rId20"/>
     <p:sldId id="271" r:id="rId21"/>
     <p:sldId id="288" r:id="rId22"/>
-    <p:sldId id="283" r:id="rId23"/>
-    <p:sldId id="284" r:id="rId24"/>
-    <p:sldId id="285" r:id="rId25"/>
-    <p:sldId id="286" r:id="rId26"/>
-    <p:sldId id="287" r:id="rId27"/>
-    <p:sldId id="272" r:id="rId28"/>
-    <p:sldId id="273" r:id="rId29"/>
-    <p:sldId id="274" r:id="rId30"/>
-    <p:sldId id="275" r:id="rId31"/>
-    <p:sldId id="276" r:id="rId32"/>
-    <p:sldId id="277" r:id="rId33"/>
-    <p:sldId id="278" r:id="rId34"/>
-    <p:sldId id="279" r:id="rId35"/>
-    <p:sldId id="280" r:id="rId36"/>
-    <p:sldId id="281" r:id="rId37"/>
-    <p:sldId id="282" r:id="rId38"/>
+    <p:sldId id="293" r:id="rId23"/>
+    <p:sldId id="283" r:id="rId24"/>
+    <p:sldId id="284" r:id="rId25"/>
+    <p:sldId id="285" r:id="rId26"/>
+    <p:sldId id="286" r:id="rId27"/>
+    <p:sldId id="287" r:id="rId28"/>
+    <p:sldId id="272" r:id="rId29"/>
+    <p:sldId id="273" r:id="rId30"/>
+    <p:sldId id="274" r:id="rId31"/>
+    <p:sldId id="275" r:id="rId32"/>
+    <p:sldId id="276" r:id="rId33"/>
+    <p:sldId id="277" r:id="rId34"/>
+    <p:sldId id="278" r:id="rId35"/>
+    <p:sldId id="279" r:id="rId36"/>
+    <p:sldId id="280" r:id="rId37"/>
+    <p:sldId id="281" r:id="rId38"/>
+    <p:sldId id="282" r:id="rId39"/>
   </p:sldIdLst>
   <p:sldSz cx="12192000" cy="6858000"/>
   <p:notesSz cx="6858000" cy="9144000"/>
@@ -177,6 +178,7 @@
         <p14:section name="Data formats" id="{72F71925-62BF-470C-96CA-CD792676F252}">
           <p14:sldIdLst>
             <p14:sldId id="288"/>
+            <p14:sldId id="293"/>
             <p14:sldId id="283"/>
             <p14:sldId id="284"/>
             <p14:sldId id="285"/>
@@ -10342,6 +10344,316 @@
           <a:p>
             <a:r>
               <a:rPr lang="en-US" dirty="0" smtClean="0"/>
+              <a:t>Libraries &amp; data formats</a:t>
+            </a:r>
+            <a:endParaRPr lang="en-US" dirty="0"/>
+          </a:p>
+        </p:txBody>
+      </p:sp>
+      <p:sp>
+        <p:nvSpPr>
+          <p:cNvPr id="3" name="Content Placeholder 2"/>
+          <p:cNvSpPr>
+            <a:spLocks noGrp="1"/>
+          </p:cNvSpPr>
+          <p:nvPr>
+            <p:ph idx="1"/>
+          </p:nvPr>
+        </p:nvSpPr>
+        <p:spPr/>
+        <p:txBody>
+          <a:bodyPr>
+            <a:normAutofit lnSpcReduction="10000"/>
+          </a:bodyPr>
+          <a:lstStyle/>
+          <a:p>
+            <a:r>
+              <a:rPr lang="en-US" dirty="0" smtClean="0"/>
+              <a:t>Standard library (Python 3.x)</a:t>
+            </a:r>
+          </a:p>
+          <a:p>
+            <a:pPr lvl="1"/>
+            <a:r>
+              <a:rPr lang="en-US" dirty="0" smtClean="0"/>
+              <a:t>Comma separated value files: </a:t>
+            </a:r>
+            <a:r>
+              <a:rPr lang="en-US" dirty="0" err="1" smtClean="0">
+                <a:latin typeface="Courier New" panose="02070309020205020404" pitchFamily="49" charset="0"/>
+                <a:cs typeface="Courier New" panose="02070309020205020404" pitchFamily="49" charset="0"/>
+              </a:rPr>
+              <a:t>csv</a:t>
+            </a:r>
+            <a:endParaRPr lang="en-US" dirty="0" smtClean="0">
+              <a:latin typeface="Courier New" panose="02070309020205020404" pitchFamily="49" charset="0"/>
+              <a:cs typeface="Courier New" panose="02070309020205020404" pitchFamily="49" charset="0"/>
+            </a:endParaRPr>
+          </a:p>
+          <a:p>
+            <a:pPr lvl="1"/>
+            <a:r>
+              <a:rPr lang="en-US" dirty="0" smtClean="0"/>
+              <a:t>Configuration files: </a:t>
+            </a:r>
+            <a:r>
+              <a:rPr lang="en-US" dirty="0" err="1" smtClean="0">
+                <a:latin typeface="Courier New" panose="02070309020205020404" pitchFamily="49" charset="0"/>
+                <a:cs typeface="Courier New" panose="02070309020205020404" pitchFamily="49" charset="0"/>
+              </a:rPr>
+              <a:t>ConfigParser</a:t>
+            </a:r>
+            <a:endParaRPr lang="en-US" dirty="0" smtClean="0"/>
+          </a:p>
+          <a:p>
+            <a:pPr lvl="1"/>
+            <a:r>
+              <a:rPr lang="en-US" dirty="0" smtClean="0"/>
+              <a:t>Semi-structured data: </a:t>
+            </a:r>
+            <a:r>
+              <a:rPr lang="en-US" dirty="0" err="1" smtClean="0">
+                <a:latin typeface="Courier New" panose="02070309020205020404" pitchFamily="49" charset="0"/>
+                <a:cs typeface="Courier New" panose="02070309020205020404" pitchFamily="49" charset="0"/>
+              </a:rPr>
+              <a:t>json</a:t>
+            </a:r>
+            <a:r>
+              <a:rPr lang="en-US" dirty="0" smtClean="0"/>
+              <a:t>, </a:t>
+            </a:r>
+            <a:r>
+              <a:rPr lang="en-US" dirty="0" err="1" smtClean="0">
+                <a:latin typeface="Courier New" panose="02070309020205020404" pitchFamily="49" charset="0"/>
+                <a:cs typeface="Courier New" panose="02070309020205020404" pitchFamily="49" charset="0"/>
+              </a:rPr>
+              <a:t>htmllib</a:t>
+            </a:r>
+            <a:r>
+              <a:rPr lang="en-US" dirty="0" smtClean="0"/>
+              <a:t>, </a:t>
+            </a:r>
+            <a:r>
+              <a:rPr lang="en-US" dirty="0" err="1" smtClean="0">
+                <a:latin typeface="Courier New" panose="02070309020205020404" pitchFamily="49" charset="0"/>
+                <a:cs typeface="Courier New" panose="02070309020205020404" pitchFamily="49" charset="0"/>
+              </a:rPr>
+              <a:t>sgmllib</a:t>
+            </a:r>
+            <a:r>
+              <a:rPr lang="en-US" dirty="0" smtClean="0"/>
+              <a:t>, </a:t>
+            </a:r>
+            <a:r>
+              <a:rPr lang="en-US" dirty="0" smtClean="0">
+                <a:latin typeface="Courier New" panose="02070309020205020404" pitchFamily="49" charset="0"/>
+                <a:cs typeface="Courier New" panose="02070309020205020404" pitchFamily="49" charset="0"/>
+              </a:rPr>
+              <a:t>xml</a:t>
+            </a:r>
+          </a:p>
+          <a:p>
+            <a:r>
+              <a:rPr lang="en-US" dirty="0" smtClean="0"/>
+              <a:t>Non-standard libraries</a:t>
+            </a:r>
+          </a:p>
+          <a:p>
+            <a:pPr lvl="1"/>
+            <a:r>
+              <a:rPr lang="en-US" dirty="0" smtClean="0"/>
+              <a:t>Images: </a:t>
+            </a:r>
+            <a:r>
+              <a:rPr lang="en-US" dirty="0" err="1" smtClean="0"/>
+              <a:t>scikit</a:t>
+            </a:r>
+            <a:r>
+              <a:rPr lang="en-US" dirty="0" smtClean="0"/>
+              <a:t>-image</a:t>
+            </a:r>
+          </a:p>
+          <a:p>
+            <a:pPr lvl="1"/>
+            <a:r>
+              <a:rPr lang="en-US" dirty="0" smtClean="0"/>
+              <a:t>HDF5: </a:t>
+            </a:r>
+            <a:r>
+              <a:rPr lang="en-US" dirty="0" err="1" smtClean="0"/>
+              <a:t>pytables</a:t>
+            </a:r>
+            <a:endParaRPr lang="en-US" dirty="0" smtClean="0"/>
+          </a:p>
+          <a:p>
+            <a:pPr lvl="1"/>
+            <a:r>
+              <a:rPr lang="en-US" dirty="0" smtClean="0"/>
+              <a:t>pandas</a:t>
+            </a:r>
+          </a:p>
+          <a:p>
+            <a:pPr lvl="1"/>
+            <a:r>
+              <a:rPr lang="en-US" dirty="0" smtClean="0"/>
+              <a:t>Bioinformatics: </a:t>
+            </a:r>
+            <a:r>
+              <a:rPr lang="en-US" dirty="0" err="1" smtClean="0"/>
+              <a:t>Biopython</a:t>
+            </a:r>
+            <a:endParaRPr lang="en-US" dirty="0"/>
+          </a:p>
+        </p:txBody>
+      </p:sp>
+      <p:sp>
+        <p:nvSpPr>
+          <p:cNvPr id="4" name="TextBox 3"/>
+          <p:cNvSpPr txBox="1"/>
+          <p:nvPr/>
+        </p:nvSpPr>
+        <p:spPr>
+          <a:xfrm>
+            <a:off x="7176121" y="4725145"/>
+            <a:ext cx="2966453" cy="954107"/>
+          </a:xfrm>
+          <a:prstGeom prst="rect">
+            <a:avLst/>
+          </a:prstGeom>
+          <a:noFill/>
+          <a:ln>
+            <a:solidFill>
+              <a:schemeClr val="tx1"/>
+            </a:solidFill>
+          </a:ln>
+        </p:spPr>
+        <p:txBody>
+          <a:bodyPr wrap="none" rtlCol="0">
+            <a:spAutoFit/>
+          </a:bodyPr>
+          <a:lstStyle/>
+          <a:p>
+            <a:r>
+              <a:rPr lang="en-US" sz="2800" dirty="0">
+                <a:solidFill>
+                  <a:prstClr val="black"/>
+                </a:solidFill>
+                <a:latin typeface="Calibri"/>
+              </a:rPr>
+              <a:t>Use the "batteries"</a:t>
+            </a:r>
+            <a:br>
+              <a:rPr lang="en-US" sz="2800" dirty="0">
+                <a:solidFill>
+                  <a:prstClr val="black"/>
+                </a:solidFill>
+                <a:latin typeface="Calibri"/>
+              </a:rPr>
+            </a:br>
+            <a:r>
+              <a:rPr lang="en-US" sz="2800" dirty="0">
+                <a:solidFill>
+                  <a:prstClr val="black"/>
+                </a:solidFill>
+                <a:latin typeface="Calibri"/>
+              </a:rPr>
+              <a:t>that are included!</a:t>
+            </a:r>
+          </a:p>
+        </p:txBody>
+      </p:sp>
+      <p:sp>
+        <p:nvSpPr>
+          <p:cNvPr id="5" name="Slide Number Placeholder 4"/>
+          <p:cNvSpPr>
+            <a:spLocks noGrp="1"/>
+          </p:cNvSpPr>
+          <p:nvPr>
+            <p:ph type="sldNum" sz="quarter" idx="12"/>
+          </p:nvPr>
+        </p:nvSpPr>
+        <p:spPr/>
+        <p:txBody>
+          <a:bodyPr/>
+          <a:lstStyle/>
+          <a:p>
+            <a:fld id="{5A209D72-2E9D-49B0-8977-41DCCC66C0BB}" type="slidenum">
+              <a:rPr lang="nl-BE">
+                <a:solidFill>
+                  <a:prstClr val="black">
+                    <a:tint val="75000"/>
+                  </a:prstClr>
+                </a:solidFill>
+                <a:latin typeface="Calibri"/>
+              </a:rPr>
+              <a:pPr/>
+              <a:t>21</a:t>
+            </a:fld>
+            <a:endParaRPr lang="nl-BE">
+              <a:solidFill>
+                <a:prstClr val="black">
+                  <a:tint val="75000"/>
+                </a:prstClr>
+              </a:solidFill>
+              <a:latin typeface="Calibri"/>
+            </a:endParaRPr>
+          </a:p>
+        </p:txBody>
+      </p:sp>
+    </p:spTree>
+    <p:extLst>
+      <p:ext uri="{BB962C8B-B14F-4D97-AF65-F5344CB8AC3E}">
+        <p14:creationId xmlns:p14="http://schemas.microsoft.com/office/powerpoint/2010/main" val="260850781"/>
+      </p:ext>
+    </p:extLst>
+  </p:cSld>
+  <p:clrMapOvr>
+    <a:masterClrMapping/>
+  </p:clrMapOvr>
+  <p:timing>
+    <p:tnLst>
+      <p:par>
+        <p:cTn id="1" dur="indefinite" restart="never" nodeType="tmRoot"/>
+      </p:par>
+    </p:tnLst>
+  </p:timing>
+</p:sld>
+</file>
+
+<file path=ppt/slides/slide22.xml><?xml version="1.0" encoding="utf-8"?>
+<p:sld xmlns:a="http://schemas.openxmlformats.org/drawingml/2006/main" xmlns:r="http://schemas.openxmlformats.org/officeDocument/2006/relationships" xmlns:p="http://schemas.openxmlformats.org/presentationml/2006/main">
+  <p:cSld>
+    <p:spTree>
+      <p:nvGrpSpPr>
+        <p:cNvPr id="1" name=""/>
+        <p:cNvGrpSpPr/>
+        <p:nvPr/>
+      </p:nvGrpSpPr>
+      <p:grpSpPr>
+        <a:xfrm>
+          <a:off x="0" y="0"/>
+          <a:ext cx="0" cy="0"/>
+          <a:chOff x="0" y="0"/>
+          <a:chExt cx="0" cy="0"/>
+        </a:xfrm>
+      </p:grpSpPr>
+      <p:sp>
+        <p:nvSpPr>
+          <p:cNvPr id="2" name="Title 1"/>
+          <p:cNvSpPr>
+            <a:spLocks noGrp="1"/>
+          </p:cNvSpPr>
+          <p:nvPr>
+            <p:ph type="title"/>
+          </p:nvPr>
+        </p:nvSpPr>
+        <p:spPr/>
+        <p:txBody>
+          <a:bodyPr/>
+          <a:lstStyle/>
+          <a:p>
+            <a:r>
+              <a:rPr lang="en-US" dirty="0" smtClean="0"/>
               <a:t>Data formats: CSV</a:t>
             </a:r>
             <a:endParaRPr lang="en-US" dirty="0"/>
@@ -11367,7 +11679,7 @@
                 <a:latin typeface="Calibri"/>
               </a:rPr>
               <a:pPr/>
-              <a:t>21</a:t>
+              <a:t>22</a:t>
             </a:fld>
             <a:endParaRPr lang="nl-BE">
               <a:solidFill>
@@ -11603,7 +11915,7 @@
 </p:sld>
 </file>
 
-<file path=ppt/slides/slide22.xml><?xml version="1.0" encoding="utf-8"?>
+<file path=ppt/slides/slide23.xml><?xml version="1.0" encoding="utf-8"?>
 <p:sld xmlns:a="http://schemas.openxmlformats.org/drawingml/2006/main" xmlns:r="http://schemas.openxmlformats.org/officeDocument/2006/relationships" xmlns:p="http://schemas.openxmlformats.org/presentationml/2006/main">
   <p:cSld>
     <p:spTree>
@@ -12246,7 +12558,7 @@
                 <a:latin typeface="Calibri"/>
               </a:rPr>
               <a:pPr/>
-              <a:t>22</a:t>
+              <a:t>23</a:t>
             </a:fld>
             <a:endParaRPr lang="nl-BE">
               <a:solidFill>
@@ -12727,7 +13039,7 @@
 </p:sld>
 </file>
 
-<file path=ppt/slides/slide23.xml><?xml version="1.0" encoding="utf-8"?>
+<file path=ppt/slides/slide24.xml><?xml version="1.0" encoding="utf-8"?>
 <p:sld xmlns:a="http://schemas.openxmlformats.org/drawingml/2006/main" xmlns:r="http://schemas.openxmlformats.org/officeDocument/2006/relationships" xmlns:p="http://schemas.openxmlformats.org/presentationml/2006/main">
   <p:cSld>
     <p:spTree>
@@ -12815,7 +13127,7 @@
                 <a:latin typeface="Calibri"/>
               </a:rPr>
               <a:pPr/>
-              <a:t>23</a:t>
+              <a:t>24</a:t>
             </a:fld>
             <a:endParaRPr lang="nl-BE">
               <a:solidFill>
@@ -16311,359 +16623,6 @@
 </p:sld>
 </file>
 
-<file path=ppt/slides/slide24.xml><?xml version="1.0" encoding="utf-8"?>
-<p:sld xmlns:a="http://schemas.openxmlformats.org/drawingml/2006/main" xmlns:r="http://schemas.openxmlformats.org/officeDocument/2006/relationships" xmlns:p="http://schemas.openxmlformats.org/presentationml/2006/main">
-  <p:cSld>
-    <p:spTree>
-      <p:nvGrpSpPr>
-        <p:cNvPr id="1" name=""/>
-        <p:cNvGrpSpPr/>
-        <p:nvPr/>
-      </p:nvGrpSpPr>
-      <p:grpSpPr>
-        <a:xfrm>
-          <a:off x="0" y="0"/>
-          <a:ext cx="0" cy="0"/>
-          <a:chOff x="0" y="0"/>
-          <a:chExt cx="0" cy="0"/>
-        </a:xfrm>
-      </p:grpSpPr>
-      <p:sp>
-        <p:nvSpPr>
-          <p:cNvPr id="2" name="Title 1"/>
-          <p:cNvSpPr>
-            <a:spLocks noGrp="1"/>
-          </p:cNvSpPr>
-          <p:nvPr>
-            <p:ph type="title"/>
-          </p:nvPr>
-        </p:nvSpPr>
-        <p:spPr/>
-        <p:txBody>
-          <a:bodyPr/>
-          <a:lstStyle/>
-          <a:p>
-            <a:r>
-              <a:rPr lang="en-US" dirty="0" smtClean="0"/>
-              <a:t>Data formats: XML output</a:t>
-            </a:r>
-            <a:endParaRPr lang="en-US" dirty="0"/>
-          </a:p>
-        </p:txBody>
-      </p:sp>
-      <p:sp>
-        <p:nvSpPr>
-          <p:cNvPr id="3" name="TextBox 2"/>
-          <p:cNvSpPr txBox="1"/>
-          <p:nvPr/>
-        </p:nvSpPr>
-        <p:spPr>
-          <a:xfrm>
-            <a:off x="2063552" y="1268760"/>
-            <a:ext cx="8064896" cy="5355312"/>
-          </a:xfrm>
-          <a:prstGeom prst="rect">
-            <a:avLst/>
-          </a:prstGeom>
-          <a:solidFill>
-            <a:schemeClr val="bg1">
-              <a:lumMod val="75000"/>
-            </a:schemeClr>
-          </a:solidFill>
-        </p:spPr>
-        <p:txBody>
-          <a:bodyPr wrap="square" rtlCol="0">
-            <a:spAutoFit/>
-          </a:bodyPr>
-          <a:lstStyle/>
-          <a:p>
-            <a:r>
-              <a:rPr lang="en-US" dirty="0">
-                <a:solidFill>
-                  <a:prstClr val="black"/>
-                </a:solidFill>
-                <a:latin typeface="Courier New" pitchFamily="49" charset="0"/>
-                <a:cs typeface="Courier New" pitchFamily="49" charset="0"/>
-              </a:rPr>
-              <a:t>&lt;?xml version="1.0" ?&gt;</a:t>
-            </a:r>
-          </a:p>
-          <a:p>
-            <a:r>
-              <a:rPr lang="en-US" dirty="0">
-                <a:solidFill>
-                  <a:prstClr val="black"/>
-                </a:solidFill>
-                <a:latin typeface="Courier New" pitchFamily="49" charset="0"/>
-                <a:cs typeface="Courier New" pitchFamily="49" charset="0"/>
-              </a:rPr>
-              <a:t>&lt;blocks&gt;</a:t>
-            </a:r>
-          </a:p>
-          <a:p>
-            <a:r>
-              <a:rPr lang="en-US" dirty="0">
-                <a:solidFill>
-                  <a:prstClr val="black"/>
-                </a:solidFill>
-                <a:latin typeface="Courier New" pitchFamily="49" charset="0"/>
-                <a:cs typeface="Courier New" pitchFamily="49" charset="0"/>
-              </a:rPr>
-              <a:t>  &lt;block name="block_01"&gt;</a:t>
-            </a:r>
-          </a:p>
-          <a:p>
-            <a:r>
-              <a:rPr lang="en-US" dirty="0">
-                <a:solidFill>
-                  <a:prstClr val="black"/>
-                </a:solidFill>
-                <a:latin typeface="Courier New" pitchFamily="49" charset="0"/>
-                <a:cs typeface="Courier New" pitchFamily="49" charset="0"/>
-              </a:rPr>
-              <a:t>    &lt;item&gt;</a:t>
-            </a:r>
-          </a:p>
-          <a:p>
-            <a:r>
-              <a:rPr lang="en-US" dirty="0">
-                <a:solidFill>
-                  <a:prstClr val="black"/>
-                </a:solidFill>
-                <a:latin typeface="Courier New" pitchFamily="49" charset="0"/>
-                <a:cs typeface="Courier New" pitchFamily="49" charset="0"/>
-              </a:rPr>
-              <a:t>      0.1</a:t>
-            </a:r>
-          </a:p>
-          <a:p>
-            <a:r>
-              <a:rPr lang="en-US" dirty="0">
-                <a:solidFill>
-                  <a:prstClr val="black"/>
-                </a:solidFill>
-                <a:latin typeface="Courier New" pitchFamily="49" charset="0"/>
-                <a:cs typeface="Courier New" pitchFamily="49" charset="0"/>
-              </a:rPr>
-              <a:t>    &lt;/item&gt;</a:t>
-            </a:r>
-          </a:p>
-          <a:p>
-            <a:r>
-              <a:rPr lang="en-US" dirty="0">
-                <a:solidFill>
-                  <a:prstClr val="black"/>
-                </a:solidFill>
-                <a:latin typeface="Courier New" pitchFamily="49" charset="0"/>
-                <a:cs typeface="Courier New" pitchFamily="49" charset="0"/>
-              </a:rPr>
-              <a:t>    &lt;item&gt;</a:t>
-            </a:r>
-          </a:p>
-          <a:p>
-            <a:r>
-              <a:rPr lang="en-US" dirty="0">
-                <a:solidFill>
-                  <a:prstClr val="black"/>
-                </a:solidFill>
-                <a:latin typeface="Courier New" pitchFamily="49" charset="0"/>
-                <a:cs typeface="Courier New" pitchFamily="49" charset="0"/>
-              </a:rPr>
-              <a:t>      1.1</a:t>
-            </a:r>
-          </a:p>
-          <a:p>
-            <a:r>
-              <a:rPr lang="en-US" dirty="0">
-                <a:solidFill>
-                  <a:prstClr val="black"/>
-                </a:solidFill>
-                <a:latin typeface="Courier New" pitchFamily="49" charset="0"/>
-                <a:cs typeface="Courier New" pitchFamily="49" charset="0"/>
-              </a:rPr>
-              <a:t>    &lt;/item&gt;</a:t>
-            </a:r>
-          </a:p>
-          <a:p>
-            <a:r>
-              <a:rPr lang="en-US" dirty="0">
-                <a:solidFill>
-                  <a:prstClr val="black"/>
-                </a:solidFill>
-                <a:latin typeface="Courier New" pitchFamily="49" charset="0"/>
-                <a:cs typeface="Courier New" pitchFamily="49" charset="0"/>
-              </a:rPr>
-              <a:t>  &lt;/block&gt;</a:t>
-            </a:r>
-          </a:p>
-          <a:p>
-            <a:r>
-              <a:rPr lang="en-US" dirty="0">
-                <a:solidFill>
-                  <a:prstClr val="black"/>
-                </a:solidFill>
-                <a:latin typeface="Courier New" pitchFamily="49" charset="0"/>
-                <a:cs typeface="Courier New" pitchFamily="49" charset="0"/>
-              </a:rPr>
-              <a:t>  &lt;block name="block_02"&gt;</a:t>
-            </a:r>
-          </a:p>
-          <a:p>
-            <a:r>
-              <a:rPr lang="en-US" dirty="0">
-                <a:solidFill>
-                  <a:prstClr val="black"/>
-                </a:solidFill>
-                <a:latin typeface="Courier New" pitchFamily="49" charset="0"/>
-                <a:cs typeface="Courier New" pitchFamily="49" charset="0"/>
-              </a:rPr>
-              <a:t>    &lt;item&gt;</a:t>
-            </a:r>
-          </a:p>
-          <a:p>
-            <a:r>
-              <a:rPr lang="en-US" dirty="0">
-                <a:solidFill>
-                  <a:prstClr val="black"/>
-                </a:solidFill>
-                <a:latin typeface="Courier New" pitchFamily="49" charset="0"/>
-                <a:cs typeface="Courier New" pitchFamily="49" charset="0"/>
-              </a:rPr>
-              <a:t>      0.2</a:t>
-            </a:r>
-          </a:p>
-          <a:p>
-            <a:r>
-              <a:rPr lang="en-US" dirty="0">
-                <a:solidFill>
-                  <a:prstClr val="black"/>
-                </a:solidFill>
-                <a:latin typeface="Courier New" pitchFamily="49" charset="0"/>
-                <a:cs typeface="Courier New" pitchFamily="49" charset="0"/>
-              </a:rPr>
-              <a:t>    &lt;/item&gt;</a:t>
-            </a:r>
-          </a:p>
-          <a:p>
-            <a:r>
-              <a:rPr lang="en-US" dirty="0">
-                <a:solidFill>
-                  <a:prstClr val="black"/>
-                </a:solidFill>
-                <a:latin typeface="Courier New" pitchFamily="49" charset="0"/>
-                <a:cs typeface="Courier New" pitchFamily="49" charset="0"/>
-              </a:rPr>
-              <a:t>    &lt;item&gt;</a:t>
-            </a:r>
-          </a:p>
-          <a:p>
-            <a:r>
-              <a:rPr lang="en-US" dirty="0">
-                <a:solidFill>
-                  <a:prstClr val="black"/>
-                </a:solidFill>
-                <a:latin typeface="Courier New" pitchFamily="49" charset="0"/>
-                <a:cs typeface="Courier New" pitchFamily="49" charset="0"/>
-              </a:rPr>
-              <a:t>      1.2</a:t>
-            </a:r>
-          </a:p>
-          <a:p>
-            <a:r>
-              <a:rPr lang="en-US" dirty="0">
-                <a:solidFill>
-                  <a:prstClr val="black"/>
-                </a:solidFill>
-                <a:latin typeface="Courier New" pitchFamily="49" charset="0"/>
-                <a:cs typeface="Courier New" pitchFamily="49" charset="0"/>
-              </a:rPr>
-              <a:t>    &lt;/item&gt;</a:t>
-            </a:r>
-          </a:p>
-          <a:p>
-            <a:r>
-              <a:rPr lang="en-US" dirty="0">
-                <a:solidFill>
-                  <a:prstClr val="black"/>
-                </a:solidFill>
-                <a:latin typeface="Courier New" pitchFamily="49" charset="0"/>
-                <a:cs typeface="Courier New" pitchFamily="49" charset="0"/>
-              </a:rPr>
-              <a:t>  &lt;/block&gt;</a:t>
-            </a:r>
-          </a:p>
-          <a:p>
-            <a:r>
-              <a:rPr lang="en-US" dirty="0">
-                <a:solidFill>
-                  <a:prstClr val="black"/>
-                </a:solidFill>
-                <a:latin typeface="Courier New" pitchFamily="49" charset="0"/>
-                <a:cs typeface="Courier New" pitchFamily="49" charset="0"/>
-              </a:rPr>
-              <a:t>&lt;/blocks&gt;</a:t>
-            </a:r>
-          </a:p>
-        </p:txBody>
-      </p:sp>
-      <p:sp>
-        <p:nvSpPr>
-          <p:cNvPr id="4" name="Slide Number Placeholder 3"/>
-          <p:cNvSpPr>
-            <a:spLocks noGrp="1"/>
-          </p:cNvSpPr>
-          <p:nvPr>
-            <p:ph type="sldNum" sz="quarter" idx="12"/>
-          </p:nvPr>
-        </p:nvSpPr>
-        <p:spPr/>
-        <p:txBody>
-          <a:bodyPr/>
-          <a:lstStyle/>
-          <a:p>
-            <a:fld id="{5A209D72-2E9D-49B0-8977-41DCCC66C0BB}" type="slidenum">
-              <a:rPr lang="nl-BE">
-                <a:solidFill>
-                  <a:prstClr val="black">
-                    <a:tint val="75000"/>
-                  </a:prstClr>
-                </a:solidFill>
-                <a:latin typeface="Calibri"/>
-              </a:rPr>
-              <a:pPr/>
-              <a:t>24</a:t>
-            </a:fld>
-            <a:endParaRPr lang="nl-BE">
-              <a:solidFill>
-                <a:prstClr val="black">
-                  <a:tint val="75000"/>
-                </a:prstClr>
-              </a:solidFill>
-              <a:latin typeface="Calibri"/>
-            </a:endParaRPr>
-          </a:p>
-        </p:txBody>
-      </p:sp>
-    </p:spTree>
-    <p:extLst>
-      <p:ext uri="{BB962C8B-B14F-4D97-AF65-F5344CB8AC3E}">
-        <p14:creationId xmlns:p14="http://schemas.microsoft.com/office/powerpoint/2010/main" val="356106587"/>
-      </p:ext>
-    </p:extLst>
-  </p:cSld>
-  <p:clrMapOvr>
-    <a:masterClrMapping/>
-  </p:clrMapOvr>
-  <p:timing>
-    <p:tnLst>
-      <p:par>
-        <p:cTn id="1" dur="indefinite" restart="never" nodeType="tmRoot"/>
-      </p:par>
-    </p:tnLst>
-  </p:timing>
-</p:sld>
-</file>
-
 <file path=ppt/slides/slide25.xml><?xml version="1.0" encoding="utf-8"?>
 <p:sld xmlns:a="http://schemas.openxmlformats.org/drawingml/2006/main" xmlns:r="http://schemas.openxmlformats.org/officeDocument/2006/relationships" xmlns:p="http://schemas.openxmlformats.org/presentationml/2006/main">
   <p:cSld>
@@ -16698,7 +16657,7 @@
           <a:p>
             <a:r>
               <a:rPr lang="en-US" dirty="0" smtClean="0"/>
-              <a:t>Data formats: creating XML</a:t>
+              <a:t>Data formats: XML output</a:t>
             </a:r>
             <a:endParaRPr lang="en-US" dirty="0"/>
           </a:p>
@@ -16706,14 +16665,14 @@
       </p:sp>
       <p:sp>
         <p:nvSpPr>
-          <p:cNvPr id="5" name="TextBox 4"/>
+          <p:cNvPr id="3" name="TextBox 2"/>
           <p:cNvSpPr txBox="1"/>
           <p:nvPr/>
         </p:nvSpPr>
         <p:spPr>
           <a:xfrm>
-            <a:off x="1991544" y="1412777"/>
-            <a:ext cx="8064896" cy="5078313"/>
+            <a:off x="2063552" y="1268760"/>
+            <a:ext cx="8064896" cy="5355312"/>
           </a:xfrm>
           <a:prstGeom prst="rect">
             <a:avLst/>
@@ -16731,59 +16690,6 @@
           <a:lstStyle/>
           <a:p>
             <a:r>
-              <a:rPr lang="pt-BR" dirty="0">
-                <a:solidFill>
-                  <a:prstClr val="black"/>
-                </a:solidFill>
-                <a:latin typeface="Courier New" pitchFamily="49" charset="0"/>
-                <a:cs typeface="Courier New" pitchFamily="49" charset="0"/>
-              </a:rPr>
-              <a:t> 1   from xml.dom.minidom import Document</a:t>
-            </a:r>
-          </a:p>
-          <a:p>
-            <a:r>
-              <a:rPr lang="pt-BR" dirty="0">
-                <a:solidFill>
-                  <a:prstClr val="black"/>
-                </a:solidFill>
-                <a:latin typeface="Courier New" pitchFamily="49" charset="0"/>
-                <a:cs typeface="Courier New" pitchFamily="49" charset="0"/>
-              </a:rPr>
-              <a:t> 2   nr_blocks = 2</a:t>
-            </a:r>
-            <a:br>
-              <a:rPr lang="pt-BR" dirty="0">
-                <a:solidFill>
-                  <a:prstClr val="black"/>
-                </a:solidFill>
-                <a:latin typeface="Courier New" pitchFamily="49" charset="0"/>
-                <a:cs typeface="Courier New" pitchFamily="49" charset="0"/>
-              </a:rPr>
-            </a:br>
-            <a:r>
-              <a:rPr lang="pt-BR" dirty="0">
-                <a:solidFill>
-                  <a:prstClr val="black"/>
-                </a:solidFill>
-                <a:latin typeface="Courier New" pitchFamily="49" charset="0"/>
-                <a:cs typeface="Courier New" pitchFamily="49" charset="0"/>
-              </a:rPr>
-              <a:t> 3   nr_items = 2</a:t>
-            </a:r>
-          </a:p>
-          <a:p>
-            <a:r>
-              <a:rPr lang="pt-BR" dirty="0">
-                <a:solidFill>
-                  <a:prstClr val="black"/>
-                </a:solidFill>
-                <a:latin typeface="Courier New" pitchFamily="49" charset="0"/>
-                <a:cs typeface="Courier New" pitchFamily="49" charset="0"/>
-              </a:rPr>
-              <a:t> </a:t>
-            </a:r>
-            <a:r>
               <a:rPr lang="en-US" dirty="0">
                 <a:solidFill>
                   <a:prstClr val="black"/>
@@ -16791,7 +16697,7 @@
                 <a:latin typeface="Courier New" pitchFamily="49" charset="0"/>
                 <a:cs typeface="Courier New" pitchFamily="49" charset="0"/>
               </a:rPr>
-              <a:t>4   doc = Document()</a:t>
+              <a:t>&lt;?xml version="1.0" ?&gt;</a:t>
             </a:r>
           </a:p>
           <a:p>
@@ -16803,18 +16709,10 @@
                 <a:latin typeface="Courier New" pitchFamily="49" charset="0"/>
                 <a:cs typeface="Courier New" pitchFamily="49" charset="0"/>
               </a:rPr>
-              <a:t> 5   blocks = </a:t>
-            </a:r>
-            <a:r>
-              <a:rPr lang="en-US" dirty="0" err="1">
-                <a:solidFill>
-                  <a:prstClr val="black"/>
-                </a:solidFill>
-                <a:latin typeface="Courier New" pitchFamily="49" charset="0"/>
-                <a:cs typeface="Courier New" pitchFamily="49" charset="0"/>
-              </a:rPr>
-              <a:t>doc.createElement</a:t>
-            </a:r>
+              <a:t>&lt;blocks&gt;</a:t>
+            </a:r>
+          </a:p>
+          <a:p>
             <a:r>
               <a:rPr lang="en-US" dirty="0">
                 <a:solidFill>
@@ -16823,7 +16721,7 @@
                 <a:latin typeface="Courier New" pitchFamily="49" charset="0"/>
                 <a:cs typeface="Courier New" pitchFamily="49" charset="0"/>
               </a:rPr>
-              <a:t>('blocks')</a:t>
+              <a:t>  &lt;block name="block_01"&gt;</a:t>
             </a:r>
           </a:p>
           <a:p>
@@ -16835,18 +16733,10 @@
                 <a:latin typeface="Courier New" pitchFamily="49" charset="0"/>
                 <a:cs typeface="Courier New" pitchFamily="49" charset="0"/>
               </a:rPr>
-              <a:t> 6   </a:t>
-            </a:r>
-            <a:r>
-              <a:rPr lang="en-US" dirty="0" err="1">
-                <a:solidFill>
-                  <a:prstClr val="black"/>
-                </a:solidFill>
-                <a:latin typeface="Courier New" pitchFamily="49" charset="0"/>
-                <a:cs typeface="Courier New" pitchFamily="49" charset="0"/>
-              </a:rPr>
-              <a:t>doc.appendChild</a:t>
-            </a:r>
+              <a:t>    &lt;item&gt;</a:t>
+            </a:r>
+          </a:p>
+          <a:p>
             <a:r>
               <a:rPr lang="en-US" dirty="0">
                 <a:solidFill>
@@ -16855,7 +16745,7 @@
                 <a:latin typeface="Courier New" pitchFamily="49" charset="0"/>
                 <a:cs typeface="Courier New" pitchFamily="49" charset="0"/>
               </a:rPr>
-              <a:t>(blocks)</a:t>
+              <a:t>      0.1</a:t>
             </a:r>
           </a:p>
           <a:p>
@@ -16867,18 +16757,10 @@
                 <a:latin typeface="Courier New" pitchFamily="49" charset="0"/>
                 <a:cs typeface="Courier New" pitchFamily="49" charset="0"/>
               </a:rPr>
-              <a:t> 7   for </a:t>
-            </a:r>
-            <a:r>
-              <a:rPr lang="en-US" dirty="0" err="1">
-                <a:solidFill>
-                  <a:prstClr val="black"/>
-                </a:solidFill>
-                <a:latin typeface="Courier New" pitchFamily="49" charset="0"/>
-                <a:cs typeface="Courier New" pitchFamily="49" charset="0"/>
-              </a:rPr>
-              <a:t>block_nr</a:t>
-            </a:r>
+              <a:t>    &lt;/item&gt;</a:t>
+            </a:r>
+          </a:p>
+          <a:p>
             <a:r>
               <a:rPr lang="en-US" dirty="0">
                 <a:solidFill>
@@ -16887,18 +16769,10 @@
                 <a:latin typeface="Courier New" pitchFamily="49" charset="0"/>
                 <a:cs typeface="Courier New" pitchFamily="49" charset="0"/>
               </a:rPr>
-              <a:t> in range(1, </a:t>
-            </a:r>
-            <a:r>
-              <a:rPr lang="en-US" dirty="0" err="1">
-                <a:solidFill>
-                  <a:prstClr val="black"/>
-                </a:solidFill>
-                <a:latin typeface="Courier New" pitchFamily="49" charset="0"/>
-                <a:cs typeface="Courier New" pitchFamily="49" charset="0"/>
-              </a:rPr>
-              <a:t>nr_blocks</a:t>
-            </a:r>
+              <a:t>    &lt;item&gt;</a:t>
+            </a:r>
+          </a:p>
+          <a:p>
             <a:r>
               <a:rPr lang="en-US" dirty="0">
                 <a:solidFill>
@@ -16907,7 +16781,7 @@
                 <a:latin typeface="Courier New" pitchFamily="49" charset="0"/>
                 <a:cs typeface="Courier New" pitchFamily="49" charset="0"/>
               </a:rPr>
-              <a:t> + 1):</a:t>
+              <a:t>      1.1</a:t>
             </a:r>
           </a:p>
           <a:p>
@@ -16919,18 +16793,10 @@
                 <a:latin typeface="Courier New" pitchFamily="49" charset="0"/>
                 <a:cs typeface="Courier New" pitchFamily="49" charset="0"/>
               </a:rPr>
-              <a:t> 8       block = </a:t>
-            </a:r>
-            <a:r>
-              <a:rPr lang="en-US" dirty="0" err="1">
-                <a:solidFill>
-                  <a:prstClr val="black"/>
-                </a:solidFill>
-                <a:latin typeface="Courier New" pitchFamily="49" charset="0"/>
-                <a:cs typeface="Courier New" pitchFamily="49" charset="0"/>
-              </a:rPr>
-              <a:t>doc.createElement</a:t>
-            </a:r>
+              <a:t>    &lt;/item&gt;</a:t>
+            </a:r>
+          </a:p>
+          <a:p>
             <a:r>
               <a:rPr lang="en-US" dirty="0">
                 <a:solidFill>
@@ -16939,7 +16805,7 @@
                 <a:latin typeface="Courier New" pitchFamily="49" charset="0"/>
                 <a:cs typeface="Courier New" pitchFamily="49" charset="0"/>
               </a:rPr>
-              <a:t>('block')</a:t>
+              <a:t>  &lt;/block&gt;</a:t>
             </a:r>
           </a:p>
           <a:p>
@@ -16951,18 +16817,10 @@
                 <a:latin typeface="Courier New" pitchFamily="49" charset="0"/>
                 <a:cs typeface="Courier New" pitchFamily="49" charset="0"/>
               </a:rPr>
-              <a:t> 9       </a:t>
-            </a:r>
-            <a:r>
-              <a:rPr lang="en-US" dirty="0" err="1">
-                <a:solidFill>
-                  <a:prstClr val="black"/>
-                </a:solidFill>
-                <a:latin typeface="Courier New" pitchFamily="49" charset="0"/>
-                <a:cs typeface="Courier New" pitchFamily="49" charset="0"/>
-              </a:rPr>
-              <a:t>block_name</a:t>
-            </a:r>
+              <a:t>  &lt;block name="block_02"&gt;</a:t>
+            </a:r>
+          </a:p>
+          <a:p>
             <a:r>
               <a:rPr lang="en-US" dirty="0">
                 <a:solidFill>
@@ -16971,18 +16829,10 @@
                 <a:latin typeface="Courier New" pitchFamily="49" charset="0"/>
                 <a:cs typeface="Courier New" pitchFamily="49" charset="0"/>
               </a:rPr>
-              <a:t> = 'block_{0:02d}'.format(</a:t>
-            </a:r>
-            <a:r>
-              <a:rPr lang="en-US" dirty="0" err="1">
-                <a:solidFill>
-                  <a:prstClr val="black"/>
-                </a:solidFill>
-                <a:latin typeface="Courier New" pitchFamily="49" charset="0"/>
-                <a:cs typeface="Courier New" pitchFamily="49" charset="0"/>
-              </a:rPr>
-              <a:t>block_nr</a:t>
-            </a:r>
+              <a:t>    &lt;item&gt;</a:t>
+            </a:r>
+          </a:p>
+          <a:p>
             <a:r>
               <a:rPr lang="en-US" dirty="0">
                 <a:solidFill>
@@ -16991,7 +16841,7 @@
                 <a:latin typeface="Courier New" pitchFamily="49" charset="0"/>
                 <a:cs typeface="Courier New" pitchFamily="49" charset="0"/>
               </a:rPr>
-              <a:t>)</a:t>
+              <a:t>      0.2</a:t>
             </a:r>
           </a:p>
           <a:p>
@@ -17003,18 +16853,10 @@
                 <a:latin typeface="Courier New" pitchFamily="49" charset="0"/>
                 <a:cs typeface="Courier New" pitchFamily="49" charset="0"/>
               </a:rPr>
-              <a:t>10       </a:t>
-            </a:r>
-            <a:r>
-              <a:rPr lang="en-US" dirty="0" err="1">
-                <a:solidFill>
-                  <a:prstClr val="black"/>
-                </a:solidFill>
-                <a:latin typeface="Courier New" pitchFamily="49" charset="0"/>
-                <a:cs typeface="Courier New" pitchFamily="49" charset="0"/>
-              </a:rPr>
-              <a:t>block.setAttribute</a:t>
-            </a:r>
+              <a:t>    &lt;/item&gt;</a:t>
+            </a:r>
+          </a:p>
+          <a:p>
             <a:r>
               <a:rPr lang="en-US" dirty="0">
                 <a:solidFill>
@@ -17023,18 +16865,10 @@
                 <a:latin typeface="Courier New" pitchFamily="49" charset="0"/>
                 <a:cs typeface="Courier New" pitchFamily="49" charset="0"/>
               </a:rPr>
-              <a:t>('name', </a:t>
-            </a:r>
-            <a:r>
-              <a:rPr lang="en-US" dirty="0" err="1">
-                <a:solidFill>
-                  <a:prstClr val="black"/>
-                </a:solidFill>
-                <a:latin typeface="Courier New" pitchFamily="49" charset="0"/>
-                <a:cs typeface="Courier New" pitchFamily="49" charset="0"/>
-              </a:rPr>
-              <a:t>block_name</a:t>
-            </a:r>
+              <a:t>    &lt;item&gt;</a:t>
+            </a:r>
+          </a:p>
+          <a:p>
             <a:r>
               <a:rPr lang="en-US" dirty="0">
                 <a:solidFill>
@@ -17043,7 +16877,7 @@
                 <a:latin typeface="Courier New" pitchFamily="49" charset="0"/>
                 <a:cs typeface="Courier New" pitchFamily="49" charset="0"/>
               </a:rPr>
-              <a:t>)</a:t>
+              <a:t>      1.2</a:t>
             </a:r>
           </a:p>
           <a:p>
@@ -17055,18 +16889,10 @@
                 <a:latin typeface="Courier New" pitchFamily="49" charset="0"/>
                 <a:cs typeface="Courier New" pitchFamily="49" charset="0"/>
               </a:rPr>
-              <a:t>11       </a:t>
-            </a:r>
-            <a:r>
-              <a:rPr lang="en-US" dirty="0" err="1">
-                <a:solidFill>
-                  <a:prstClr val="black"/>
-                </a:solidFill>
-                <a:latin typeface="Courier New" pitchFamily="49" charset="0"/>
-                <a:cs typeface="Courier New" pitchFamily="49" charset="0"/>
-              </a:rPr>
-              <a:t>blocks.appendChild</a:t>
-            </a:r>
+              <a:t>    &lt;/item&gt;</a:t>
+            </a:r>
+          </a:p>
+          <a:p>
             <a:r>
               <a:rPr lang="en-US" dirty="0">
                 <a:solidFill>
@@ -17075,7 +16901,7 @@
                 <a:latin typeface="Courier New" pitchFamily="49" charset="0"/>
                 <a:cs typeface="Courier New" pitchFamily="49" charset="0"/>
               </a:rPr>
-              <a:t>(block)</a:t>
+              <a:t>  &lt;/block&gt;</a:t>
             </a:r>
           </a:p>
           <a:p>
@@ -17087,306 +16913,14 @@
                 <a:latin typeface="Courier New" pitchFamily="49" charset="0"/>
                 <a:cs typeface="Courier New" pitchFamily="49" charset="0"/>
               </a:rPr>
-              <a:t>12       for </a:t>
-            </a:r>
-            <a:r>
-              <a:rPr lang="en-US" dirty="0" err="1">
-                <a:solidFill>
-                  <a:prstClr val="black"/>
-                </a:solidFill>
-                <a:latin typeface="Courier New" pitchFamily="49" charset="0"/>
-                <a:cs typeface="Courier New" pitchFamily="49" charset="0"/>
-              </a:rPr>
-              <a:t>item_nr</a:t>
-            </a:r>
-            <a:r>
-              <a:rPr lang="en-US" dirty="0">
-                <a:solidFill>
-                  <a:prstClr val="black"/>
-                </a:solidFill>
-                <a:latin typeface="Courier New" pitchFamily="49" charset="0"/>
-                <a:cs typeface="Courier New" pitchFamily="49" charset="0"/>
-              </a:rPr>
-              <a:t> in range(0, </a:t>
-            </a:r>
-            <a:r>
-              <a:rPr lang="en-US" dirty="0" err="1">
-                <a:solidFill>
-                  <a:prstClr val="black"/>
-                </a:solidFill>
-                <a:latin typeface="Courier New" pitchFamily="49" charset="0"/>
-                <a:cs typeface="Courier New" pitchFamily="49" charset="0"/>
-              </a:rPr>
-              <a:t>nr_items</a:t>
-            </a:r>
-            <a:r>
-              <a:rPr lang="en-US" dirty="0">
-                <a:solidFill>
-                  <a:prstClr val="black"/>
-                </a:solidFill>
-                <a:latin typeface="Courier New" pitchFamily="49" charset="0"/>
-                <a:cs typeface="Courier New" pitchFamily="49" charset="0"/>
-              </a:rPr>
-              <a:t>):</a:t>
-            </a:r>
-          </a:p>
-          <a:p>
-            <a:r>
-              <a:rPr lang="en-US" dirty="0">
-                <a:solidFill>
-                  <a:prstClr val="black"/>
-                </a:solidFill>
-                <a:latin typeface="Courier New" pitchFamily="49" charset="0"/>
-                <a:cs typeface="Courier New" pitchFamily="49" charset="0"/>
-              </a:rPr>
-              <a:t>13           item = </a:t>
-            </a:r>
-            <a:r>
-              <a:rPr lang="en-US" dirty="0" err="1">
-                <a:solidFill>
-                  <a:prstClr val="black"/>
-                </a:solidFill>
-                <a:latin typeface="Courier New" pitchFamily="49" charset="0"/>
-                <a:cs typeface="Courier New" pitchFamily="49" charset="0"/>
-              </a:rPr>
-              <a:t>doc.createElement</a:t>
-            </a:r>
-            <a:r>
-              <a:rPr lang="en-US" dirty="0">
-                <a:solidFill>
-                  <a:prstClr val="black"/>
-                </a:solidFill>
-                <a:latin typeface="Courier New" pitchFamily="49" charset="0"/>
-                <a:cs typeface="Courier New" pitchFamily="49" charset="0"/>
-              </a:rPr>
-              <a:t>('item')</a:t>
-            </a:r>
-          </a:p>
-          <a:p>
-            <a:r>
-              <a:rPr lang="en-US" dirty="0">
-                <a:solidFill>
-                  <a:prstClr val="black"/>
-                </a:solidFill>
-                <a:latin typeface="Courier New" pitchFamily="49" charset="0"/>
-                <a:cs typeface="Courier New" pitchFamily="49" charset="0"/>
-              </a:rPr>
-              <a:t>14           text = '{0}.{1}'.format(</a:t>
-            </a:r>
-            <a:r>
-              <a:rPr lang="en-US" dirty="0" err="1">
-                <a:solidFill>
-                  <a:prstClr val="black"/>
-                </a:solidFill>
-                <a:latin typeface="Courier New" pitchFamily="49" charset="0"/>
-                <a:cs typeface="Courier New" pitchFamily="49" charset="0"/>
-              </a:rPr>
-              <a:t>item_nr</a:t>
-            </a:r>
-            <a:r>
-              <a:rPr lang="en-US" dirty="0">
-                <a:solidFill>
-                  <a:prstClr val="black"/>
-                </a:solidFill>
-                <a:latin typeface="Courier New" pitchFamily="49" charset="0"/>
-                <a:cs typeface="Courier New" pitchFamily="49" charset="0"/>
-              </a:rPr>
-              <a:t>, </a:t>
-            </a:r>
-            <a:r>
-              <a:rPr lang="en-US" dirty="0" err="1">
-                <a:solidFill>
-                  <a:prstClr val="black"/>
-                </a:solidFill>
-                <a:latin typeface="Courier New" pitchFamily="49" charset="0"/>
-                <a:cs typeface="Courier New" pitchFamily="49" charset="0"/>
-              </a:rPr>
-              <a:t>block_nr</a:t>
-            </a:r>
-            <a:r>
-              <a:rPr lang="en-US" dirty="0">
-                <a:solidFill>
-                  <a:prstClr val="black"/>
-                </a:solidFill>
-                <a:latin typeface="Courier New" pitchFamily="49" charset="0"/>
-                <a:cs typeface="Courier New" pitchFamily="49" charset="0"/>
-              </a:rPr>
-              <a:t>)</a:t>
-            </a:r>
-          </a:p>
-          <a:p>
-            <a:r>
-              <a:rPr lang="en-US" dirty="0">
-                <a:solidFill>
-                  <a:prstClr val="black"/>
-                </a:solidFill>
-                <a:latin typeface="Courier New" pitchFamily="49" charset="0"/>
-                <a:cs typeface="Courier New" pitchFamily="49" charset="0"/>
-              </a:rPr>
-              <a:t>15           </a:t>
-            </a:r>
-            <a:r>
-              <a:rPr lang="en-US" dirty="0" err="1">
-                <a:solidFill>
-                  <a:prstClr val="black"/>
-                </a:solidFill>
-                <a:latin typeface="Courier New" pitchFamily="49" charset="0"/>
-                <a:cs typeface="Courier New" pitchFamily="49" charset="0"/>
-              </a:rPr>
-              <a:t>text_node</a:t>
-            </a:r>
-            <a:r>
-              <a:rPr lang="en-US" dirty="0">
-                <a:solidFill>
-                  <a:prstClr val="black"/>
-                </a:solidFill>
-                <a:latin typeface="Courier New" pitchFamily="49" charset="0"/>
-                <a:cs typeface="Courier New" pitchFamily="49" charset="0"/>
-              </a:rPr>
-              <a:t> = </a:t>
-            </a:r>
-            <a:r>
-              <a:rPr lang="en-US" dirty="0" err="1">
-                <a:solidFill>
-                  <a:prstClr val="black"/>
-                </a:solidFill>
-                <a:latin typeface="Courier New" pitchFamily="49" charset="0"/>
-                <a:cs typeface="Courier New" pitchFamily="49" charset="0"/>
-              </a:rPr>
-              <a:t>doc.createTextNode</a:t>
-            </a:r>
-            <a:r>
-              <a:rPr lang="en-US" dirty="0">
-                <a:solidFill>
-                  <a:prstClr val="black"/>
-                </a:solidFill>
-                <a:latin typeface="Courier New" pitchFamily="49" charset="0"/>
-                <a:cs typeface="Courier New" pitchFamily="49" charset="0"/>
-              </a:rPr>
-              <a:t>(text)</a:t>
-            </a:r>
-          </a:p>
-          <a:p>
-            <a:r>
-              <a:rPr lang="en-US" dirty="0">
-                <a:solidFill>
-                  <a:prstClr val="black"/>
-                </a:solidFill>
-                <a:latin typeface="Courier New" pitchFamily="49" charset="0"/>
-                <a:cs typeface="Courier New" pitchFamily="49" charset="0"/>
-              </a:rPr>
-              <a:t>16           </a:t>
-            </a:r>
-            <a:r>
-              <a:rPr lang="en-US" dirty="0" err="1">
-                <a:solidFill>
-                  <a:prstClr val="black"/>
-                </a:solidFill>
-                <a:latin typeface="Courier New" pitchFamily="49" charset="0"/>
-                <a:cs typeface="Courier New" pitchFamily="49" charset="0"/>
-              </a:rPr>
-              <a:t>item.appendChild</a:t>
-            </a:r>
-            <a:r>
-              <a:rPr lang="en-US" dirty="0">
-                <a:solidFill>
-                  <a:prstClr val="black"/>
-                </a:solidFill>
-                <a:latin typeface="Courier New" pitchFamily="49" charset="0"/>
-                <a:cs typeface="Courier New" pitchFamily="49" charset="0"/>
-              </a:rPr>
-              <a:t>(</a:t>
-            </a:r>
-            <a:r>
-              <a:rPr lang="en-US" dirty="0" err="1">
-                <a:solidFill>
-                  <a:prstClr val="black"/>
-                </a:solidFill>
-                <a:latin typeface="Courier New" pitchFamily="49" charset="0"/>
-                <a:cs typeface="Courier New" pitchFamily="49" charset="0"/>
-              </a:rPr>
-              <a:t>text_node</a:t>
-            </a:r>
-            <a:r>
-              <a:rPr lang="en-US" dirty="0">
-                <a:solidFill>
-                  <a:prstClr val="black"/>
-                </a:solidFill>
-                <a:latin typeface="Courier New" pitchFamily="49" charset="0"/>
-                <a:cs typeface="Courier New" pitchFamily="49" charset="0"/>
-              </a:rPr>
-              <a:t>)</a:t>
-            </a:r>
-          </a:p>
-          <a:p>
-            <a:r>
-              <a:rPr lang="en-US" dirty="0">
-                <a:solidFill>
-                  <a:prstClr val="black"/>
-                </a:solidFill>
-                <a:latin typeface="Courier New" pitchFamily="49" charset="0"/>
-                <a:cs typeface="Courier New" pitchFamily="49" charset="0"/>
-              </a:rPr>
-              <a:t>17           </a:t>
-            </a:r>
-            <a:r>
-              <a:rPr lang="en-US" dirty="0" err="1">
-                <a:solidFill>
-                  <a:prstClr val="black"/>
-                </a:solidFill>
-                <a:latin typeface="Courier New" pitchFamily="49" charset="0"/>
-                <a:cs typeface="Courier New" pitchFamily="49" charset="0"/>
-              </a:rPr>
-              <a:t>block.appendChild</a:t>
-            </a:r>
-            <a:r>
-              <a:rPr lang="en-US" dirty="0">
-                <a:solidFill>
-                  <a:prstClr val="black"/>
-                </a:solidFill>
-                <a:latin typeface="Courier New" pitchFamily="49" charset="0"/>
-                <a:cs typeface="Courier New" pitchFamily="49" charset="0"/>
-              </a:rPr>
-              <a:t>(item)</a:t>
-            </a:r>
-          </a:p>
-          <a:p>
-            <a:r>
-              <a:rPr lang="en-US" dirty="0">
-                <a:solidFill>
-                  <a:prstClr val="black"/>
-                </a:solidFill>
-                <a:latin typeface="Courier New" pitchFamily="49" charset="0"/>
-                <a:cs typeface="Courier New" pitchFamily="49" charset="0"/>
-              </a:rPr>
-              <a:t>18   print(</a:t>
-            </a:r>
-            <a:r>
-              <a:rPr lang="en-US" dirty="0" err="1">
-                <a:solidFill>
-                  <a:prstClr val="black"/>
-                </a:solidFill>
-                <a:latin typeface="Courier New" pitchFamily="49" charset="0"/>
-                <a:cs typeface="Courier New" pitchFamily="49" charset="0"/>
-              </a:rPr>
-              <a:t>doc.toprettyxml</a:t>
-            </a:r>
-            <a:r>
-              <a:rPr lang="en-US" dirty="0">
-                <a:solidFill>
-                  <a:prstClr val="black"/>
-                </a:solidFill>
-                <a:latin typeface="Courier New" pitchFamily="49" charset="0"/>
-                <a:cs typeface="Courier New" pitchFamily="49" charset="0"/>
-              </a:rPr>
-              <a:t>(indent='  '))</a:t>
+              <a:t>&lt;/blocks&gt;</a:t>
             </a:r>
           </a:p>
         </p:txBody>
       </p:sp>
       <p:sp>
         <p:nvSpPr>
-          <p:cNvPr id="3" name="Slide Number Placeholder 2"/>
+          <p:cNvPr id="4" name="Slide Number Placeholder 3"/>
           <p:cNvSpPr>
             <a:spLocks noGrp="1"/>
           </p:cNvSpPr>
@@ -17425,7 +16959,7 @@
     </p:spTree>
     <p:extLst>
       <p:ext uri="{BB962C8B-B14F-4D97-AF65-F5344CB8AC3E}">
-        <p14:creationId xmlns:p14="http://schemas.microsoft.com/office/powerpoint/2010/main" val="1324044320"/>
+        <p14:creationId xmlns:p14="http://schemas.microsoft.com/office/powerpoint/2010/main" val="356106587"/>
       </p:ext>
     </p:extLst>
   </p:cSld>
@@ -17476,6 +17010,784 @@
           <a:p>
             <a:r>
               <a:rPr lang="en-US" dirty="0" smtClean="0"/>
+              <a:t>Data formats: creating XML</a:t>
+            </a:r>
+            <a:endParaRPr lang="en-US" dirty="0"/>
+          </a:p>
+        </p:txBody>
+      </p:sp>
+      <p:sp>
+        <p:nvSpPr>
+          <p:cNvPr id="5" name="TextBox 4"/>
+          <p:cNvSpPr txBox="1"/>
+          <p:nvPr/>
+        </p:nvSpPr>
+        <p:spPr>
+          <a:xfrm>
+            <a:off x="1991544" y="1412777"/>
+            <a:ext cx="8064896" cy="5078313"/>
+          </a:xfrm>
+          <a:prstGeom prst="rect">
+            <a:avLst/>
+          </a:prstGeom>
+          <a:solidFill>
+            <a:schemeClr val="bg1">
+              <a:lumMod val="75000"/>
+            </a:schemeClr>
+          </a:solidFill>
+        </p:spPr>
+        <p:txBody>
+          <a:bodyPr wrap="square" rtlCol="0">
+            <a:spAutoFit/>
+          </a:bodyPr>
+          <a:lstStyle/>
+          <a:p>
+            <a:r>
+              <a:rPr lang="pt-BR" dirty="0">
+                <a:solidFill>
+                  <a:prstClr val="black"/>
+                </a:solidFill>
+                <a:latin typeface="Courier New" pitchFamily="49" charset="0"/>
+                <a:cs typeface="Courier New" pitchFamily="49" charset="0"/>
+              </a:rPr>
+              <a:t> 1   from xml.dom.minidom import Document</a:t>
+            </a:r>
+          </a:p>
+          <a:p>
+            <a:r>
+              <a:rPr lang="pt-BR" dirty="0">
+                <a:solidFill>
+                  <a:prstClr val="black"/>
+                </a:solidFill>
+                <a:latin typeface="Courier New" pitchFamily="49" charset="0"/>
+                <a:cs typeface="Courier New" pitchFamily="49" charset="0"/>
+              </a:rPr>
+              <a:t> 2   nr_blocks = 2</a:t>
+            </a:r>
+            <a:br>
+              <a:rPr lang="pt-BR" dirty="0">
+                <a:solidFill>
+                  <a:prstClr val="black"/>
+                </a:solidFill>
+                <a:latin typeface="Courier New" pitchFamily="49" charset="0"/>
+                <a:cs typeface="Courier New" pitchFamily="49" charset="0"/>
+              </a:rPr>
+            </a:br>
+            <a:r>
+              <a:rPr lang="pt-BR" dirty="0">
+                <a:solidFill>
+                  <a:prstClr val="black"/>
+                </a:solidFill>
+                <a:latin typeface="Courier New" pitchFamily="49" charset="0"/>
+                <a:cs typeface="Courier New" pitchFamily="49" charset="0"/>
+              </a:rPr>
+              <a:t> 3   nr_items = 2</a:t>
+            </a:r>
+          </a:p>
+          <a:p>
+            <a:r>
+              <a:rPr lang="pt-BR" dirty="0">
+                <a:solidFill>
+                  <a:prstClr val="black"/>
+                </a:solidFill>
+                <a:latin typeface="Courier New" pitchFamily="49" charset="0"/>
+                <a:cs typeface="Courier New" pitchFamily="49" charset="0"/>
+              </a:rPr>
+              <a:t> </a:t>
+            </a:r>
+            <a:r>
+              <a:rPr lang="en-US" dirty="0">
+                <a:solidFill>
+                  <a:prstClr val="black"/>
+                </a:solidFill>
+                <a:latin typeface="Courier New" pitchFamily="49" charset="0"/>
+                <a:cs typeface="Courier New" pitchFamily="49" charset="0"/>
+              </a:rPr>
+              <a:t>4   doc = Document()</a:t>
+            </a:r>
+          </a:p>
+          <a:p>
+            <a:r>
+              <a:rPr lang="en-US" dirty="0">
+                <a:solidFill>
+                  <a:prstClr val="black"/>
+                </a:solidFill>
+                <a:latin typeface="Courier New" pitchFamily="49" charset="0"/>
+                <a:cs typeface="Courier New" pitchFamily="49" charset="0"/>
+              </a:rPr>
+              <a:t> 5   blocks = </a:t>
+            </a:r>
+            <a:r>
+              <a:rPr lang="en-US" dirty="0" err="1">
+                <a:solidFill>
+                  <a:prstClr val="black"/>
+                </a:solidFill>
+                <a:latin typeface="Courier New" pitchFamily="49" charset="0"/>
+                <a:cs typeface="Courier New" pitchFamily="49" charset="0"/>
+              </a:rPr>
+              <a:t>doc.createElement</a:t>
+            </a:r>
+            <a:r>
+              <a:rPr lang="en-US" dirty="0">
+                <a:solidFill>
+                  <a:prstClr val="black"/>
+                </a:solidFill>
+                <a:latin typeface="Courier New" pitchFamily="49" charset="0"/>
+                <a:cs typeface="Courier New" pitchFamily="49" charset="0"/>
+              </a:rPr>
+              <a:t>('blocks')</a:t>
+            </a:r>
+          </a:p>
+          <a:p>
+            <a:r>
+              <a:rPr lang="en-US" dirty="0">
+                <a:solidFill>
+                  <a:prstClr val="black"/>
+                </a:solidFill>
+                <a:latin typeface="Courier New" pitchFamily="49" charset="0"/>
+                <a:cs typeface="Courier New" pitchFamily="49" charset="0"/>
+              </a:rPr>
+              <a:t> 6   </a:t>
+            </a:r>
+            <a:r>
+              <a:rPr lang="en-US" dirty="0" err="1">
+                <a:solidFill>
+                  <a:prstClr val="black"/>
+                </a:solidFill>
+                <a:latin typeface="Courier New" pitchFamily="49" charset="0"/>
+                <a:cs typeface="Courier New" pitchFamily="49" charset="0"/>
+              </a:rPr>
+              <a:t>doc.appendChild</a:t>
+            </a:r>
+            <a:r>
+              <a:rPr lang="en-US" dirty="0">
+                <a:solidFill>
+                  <a:prstClr val="black"/>
+                </a:solidFill>
+                <a:latin typeface="Courier New" pitchFamily="49" charset="0"/>
+                <a:cs typeface="Courier New" pitchFamily="49" charset="0"/>
+              </a:rPr>
+              <a:t>(blocks)</a:t>
+            </a:r>
+          </a:p>
+          <a:p>
+            <a:r>
+              <a:rPr lang="en-US" dirty="0">
+                <a:solidFill>
+                  <a:prstClr val="black"/>
+                </a:solidFill>
+                <a:latin typeface="Courier New" pitchFamily="49" charset="0"/>
+                <a:cs typeface="Courier New" pitchFamily="49" charset="0"/>
+              </a:rPr>
+              <a:t> 7   for </a:t>
+            </a:r>
+            <a:r>
+              <a:rPr lang="en-US" dirty="0" err="1">
+                <a:solidFill>
+                  <a:prstClr val="black"/>
+                </a:solidFill>
+                <a:latin typeface="Courier New" pitchFamily="49" charset="0"/>
+                <a:cs typeface="Courier New" pitchFamily="49" charset="0"/>
+              </a:rPr>
+              <a:t>block_nr</a:t>
+            </a:r>
+            <a:r>
+              <a:rPr lang="en-US" dirty="0">
+                <a:solidFill>
+                  <a:prstClr val="black"/>
+                </a:solidFill>
+                <a:latin typeface="Courier New" pitchFamily="49" charset="0"/>
+                <a:cs typeface="Courier New" pitchFamily="49" charset="0"/>
+              </a:rPr>
+              <a:t> in range(1, </a:t>
+            </a:r>
+            <a:r>
+              <a:rPr lang="en-US" dirty="0" err="1">
+                <a:solidFill>
+                  <a:prstClr val="black"/>
+                </a:solidFill>
+                <a:latin typeface="Courier New" pitchFamily="49" charset="0"/>
+                <a:cs typeface="Courier New" pitchFamily="49" charset="0"/>
+              </a:rPr>
+              <a:t>nr_blocks</a:t>
+            </a:r>
+            <a:r>
+              <a:rPr lang="en-US" dirty="0">
+                <a:solidFill>
+                  <a:prstClr val="black"/>
+                </a:solidFill>
+                <a:latin typeface="Courier New" pitchFamily="49" charset="0"/>
+                <a:cs typeface="Courier New" pitchFamily="49" charset="0"/>
+              </a:rPr>
+              <a:t> + 1):</a:t>
+            </a:r>
+          </a:p>
+          <a:p>
+            <a:r>
+              <a:rPr lang="en-US" dirty="0">
+                <a:solidFill>
+                  <a:prstClr val="black"/>
+                </a:solidFill>
+                <a:latin typeface="Courier New" pitchFamily="49" charset="0"/>
+                <a:cs typeface="Courier New" pitchFamily="49" charset="0"/>
+              </a:rPr>
+              <a:t> 8       block = </a:t>
+            </a:r>
+            <a:r>
+              <a:rPr lang="en-US" dirty="0" err="1">
+                <a:solidFill>
+                  <a:prstClr val="black"/>
+                </a:solidFill>
+                <a:latin typeface="Courier New" pitchFamily="49" charset="0"/>
+                <a:cs typeface="Courier New" pitchFamily="49" charset="0"/>
+              </a:rPr>
+              <a:t>doc.createElement</a:t>
+            </a:r>
+            <a:r>
+              <a:rPr lang="en-US" dirty="0">
+                <a:solidFill>
+                  <a:prstClr val="black"/>
+                </a:solidFill>
+                <a:latin typeface="Courier New" pitchFamily="49" charset="0"/>
+                <a:cs typeface="Courier New" pitchFamily="49" charset="0"/>
+              </a:rPr>
+              <a:t>('block')</a:t>
+            </a:r>
+          </a:p>
+          <a:p>
+            <a:r>
+              <a:rPr lang="en-US" dirty="0">
+                <a:solidFill>
+                  <a:prstClr val="black"/>
+                </a:solidFill>
+                <a:latin typeface="Courier New" pitchFamily="49" charset="0"/>
+                <a:cs typeface="Courier New" pitchFamily="49" charset="0"/>
+              </a:rPr>
+              <a:t> 9       </a:t>
+            </a:r>
+            <a:r>
+              <a:rPr lang="en-US" dirty="0" err="1">
+                <a:solidFill>
+                  <a:prstClr val="black"/>
+                </a:solidFill>
+                <a:latin typeface="Courier New" pitchFamily="49" charset="0"/>
+                <a:cs typeface="Courier New" pitchFamily="49" charset="0"/>
+              </a:rPr>
+              <a:t>block_name</a:t>
+            </a:r>
+            <a:r>
+              <a:rPr lang="en-US" dirty="0">
+                <a:solidFill>
+                  <a:prstClr val="black"/>
+                </a:solidFill>
+                <a:latin typeface="Courier New" pitchFamily="49" charset="0"/>
+                <a:cs typeface="Courier New" pitchFamily="49" charset="0"/>
+              </a:rPr>
+              <a:t> = 'block_{0:02d}'.format(</a:t>
+            </a:r>
+            <a:r>
+              <a:rPr lang="en-US" dirty="0" err="1">
+                <a:solidFill>
+                  <a:prstClr val="black"/>
+                </a:solidFill>
+                <a:latin typeface="Courier New" pitchFamily="49" charset="0"/>
+                <a:cs typeface="Courier New" pitchFamily="49" charset="0"/>
+              </a:rPr>
+              <a:t>block_nr</a:t>
+            </a:r>
+            <a:r>
+              <a:rPr lang="en-US" dirty="0">
+                <a:solidFill>
+                  <a:prstClr val="black"/>
+                </a:solidFill>
+                <a:latin typeface="Courier New" pitchFamily="49" charset="0"/>
+                <a:cs typeface="Courier New" pitchFamily="49" charset="0"/>
+              </a:rPr>
+              <a:t>)</a:t>
+            </a:r>
+          </a:p>
+          <a:p>
+            <a:r>
+              <a:rPr lang="en-US" dirty="0">
+                <a:solidFill>
+                  <a:prstClr val="black"/>
+                </a:solidFill>
+                <a:latin typeface="Courier New" pitchFamily="49" charset="0"/>
+                <a:cs typeface="Courier New" pitchFamily="49" charset="0"/>
+              </a:rPr>
+              <a:t>10       </a:t>
+            </a:r>
+            <a:r>
+              <a:rPr lang="en-US" dirty="0" err="1">
+                <a:solidFill>
+                  <a:prstClr val="black"/>
+                </a:solidFill>
+                <a:latin typeface="Courier New" pitchFamily="49" charset="0"/>
+                <a:cs typeface="Courier New" pitchFamily="49" charset="0"/>
+              </a:rPr>
+              <a:t>block.setAttribute</a:t>
+            </a:r>
+            <a:r>
+              <a:rPr lang="en-US" dirty="0">
+                <a:solidFill>
+                  <a:prstClr val="black"/>
+                </a:solidFill>
+                <a:latin typeface="Courier New" pitchFamily="49" charset="0"/>
+                <a:cs typeface="Courier New" pitchFamily="49" charset="0"/>
+              </a:rPr>
+              <a:t>('name', </a:t>
+            </a:r>
+            <a:r>
+              <a:rPr lang="en-US" dirty="0" err="1">
+                <a:solidFill>
+                  <a:prstClr val="black"/>
+                </a:solidFill>
+                <a:latin typeface="Courier New" pitchFamily="49" charset="0"/>
+                <a:cs typeface="Courier New" pitchFamily="49" charset="0"/>
+              </a:rPr>
+              <a:t>block_name</a:t>
+            </a:r>
+            <a:r>
+              <a:rPr lang="en-US" dirty="0">
+                <a:solidFill>
+                  <a:prstClr val="black"/>
+                </a:solidFill>
+                <a:latin typeface="Courier New" pitchFamily="49" charset="0"/>
+                <a:cs typeface="Courier New" pitchFamily="49" charset="0"/>
+              </a:rPr>
+              <a:t>)</a:t>
+            </a:r>
+          </a:p>
+          <a:p>
+            <a:r>
+              <a:rPr lang="en-US" dirty="0">
+                <a:solidFill>
+                  <a:prstClr val="black"/>
+                </a:solidFill>
+                <a:latin typeface="Courier New" pitchFamily="49" charset="0"/>
+                <a:cs typeface="Courier New" pitchFamily="49" charset="0"/>
+              </a:rPr>
+              <a:t>11       </a:t>
+            </a:r>
+            <a:r>
+              <a:rPr lang="en-US" dirty="0" err="1">
+                <a:solidFill>
+                  <a:prstClr val="black"/>
+                </a:solidFill>
+                <a:latin typeface="Courier New" pitchFamily="49" charset="0"/>
+                <a:cs typeface="Courier New" pitchFamily="49" charset="0"/>
+              </a:rPr>
+              <a:t>blocks.appendChild</a:t>
+            </a:r>
+            <a:r>
+              <a:rPr lang="en-US" dirty="0">
+                <a:solidFill>
+                  <a:prstClr val="black"/>
+                </a:solidFill>
+                <a:latin typeface="Courier New" pitchFamily="49" charset="0"/>
+                <a:cs typeface="Courier New" pitchFamily="49" charset="0"/>
+              </a:rPr>
+              <a:t>(block)</a:t>
+            </a:r>
+          </a:p>
+          <a:p>
+            <a:r>
+              <a:rPr lang="en-US" dirty="0">
+                <a:solidFill>
+                  <a:prstClr val="black"/>
+                </a:solidFill>
+                <a:latin typeface="Courier New" pitchFamily="49" charset="0"/>
+                <a:cs typeface="Courier New" pitchFamily="49" charset="0"/>
+              </a:rPr>
+              <a:t>12       for </a:t>
+            </a:r>
+            <a:r>
+              <a:rPr lang="en-US" dirty="0" err="1">
+                <a:solidFill>
+                  <a:prstClr val="black"/>
+                </a:solidFill>
+                <a:latin typeface="Courier New" pitchFamily="49" charset="0"/>
+                <a:cs typeface="Courier New" pitchFamily="49" charset="0"/>
+              </a:rPr>
+              <a:t>item_nr</a:t>
+            </a:r>
+            <a:r>
+              <a:rPr lang="en-US" dirty="0">
+                <a:solidFill>
+                  <a:prstClr val="black"/>
+                </a:solidFill>
+                <a:latin typeface="Courier New" pitchFamily="49" charset="0"/>
+                <a:cs typeface="Courier New" pitchFamily="49" charset="0"/>
+              </a:rPr>
+              <a:t> in range(0, </a:t>
+            </a:r>
+            <a:r>
+              <a:rPr lang="en-US" dirty="0" err="1">
+                <a:solidFill>
+                  <a:prstClr val="black"/>
+                </a:solidFill>
+                <a:latin typeface="Courier New" pitchFamily="49" charset="0"/>
+                <a:cs typeface="Courier New" pitchFamily="49" charset="0"/>
+              </a:rPr>
+              <a:t>nr_items</a:t>
+            </a:r>
+            <a:r>
+              <a:rPr lang="en-US" dirty="0">
+                <a:solidFill>
+                  <a:prstClr val="black"/>
+                </a:solidFill>
+                <a:latin typeface="Courier New" pitchFamily="49" charset="0"/>
+                <a:cs typeface="Courier New" pitchFamily="49" charset="0"/>
+              </a:rPr>
+              <a:t>):</a:t>
+            </a:r>
+          </a:p>
+          <a:p>
+            <a:r>
+              <a:rPr lang="en-US" dirty="0">
+                <a:solidFill>
+                  <a:prstClr val="black"/>
+                </a:solidFill>
+                <a:latin typeface="Courier New" pitchFamily="49" charset="0"/>
+                <a:cs typeface="Courier New" pitchFamily="49" charset="0"/>
+              </a:rPr>
+              <a:t>13           item = </a:t>
+            </a:r>
+            <a:r>
+              <a:rPr lang="en-US" dirty="0" err="1">
+                <a:solidFill>
+                  <a:prstClr val="black"/>
+                </a:solidFill>
+                <a:latin typeface="Courier New" pitchFamily="49" charset="0"/>
+                <a:cs typeface="Courier New" pitchFamily="49" charset="0"/>
+              </a:rPr>
+              <a:t>doc.createElement</a:t>
+            </a:r>
+            <a:r>
+              <a:rPr lang="en-US" dirty="0">
+                <a:solidFill>
+                  <a:prstClr val="black"/>
+                </a:solidFill>
+                <a:latin typeface="Courier New" pitchFamily="49" charset="0"/>
+                <a:cs typeface="Courier New" pitchFamily="49" charset="0"/>
+              </a:rPr>
+              <a:t>('item')</a:t>
+            </a:r>
+          </a:p>
+          <a:p>
+            <a:r>
+              <a:rPr lang="en-US" dirty="0">
+                <a:solidFill>
+                  <a:prstClr val="black"/>
+                </a:solidFill>
+                <a:latin typeface="Courier New" pitchFamily="49" charset="0"/>
+                <a:cs typeface="Courier New" pitchFamily="49" charset="0"/>
+              </a:rPr>
+              <a:t>14           text = '{0}.{1}'.format(</a:t>
+            </a:r>
+            <a:r>
+              <a:rPr lang="en-US" dirty="0" err="1">
+                <a:solidFill>
+                  <a:prstClr val="black"/>
+                </a:solidFill>
+                <a:latin typeface="Courier New" pitchFamily="49" charset="0"/>
+                <a:cs typeface="Courier New" pitchFamily="49" charset="0"/>
+              </a:rPr>
+              <a:t>item_nr</a:t>
+            </a:r>
+            <a:r>
+              <a:rPr lang="en-US" dirty="0">
+                <a:solidFill>
+                  <a:prstClr val="black"/>
+                </a:solidFill>
+                <a:latin typeface="Courier New" pitchFamily="49" charset="0"/>
+                <a:cs typeface="Courier New" pitchFamily="49" charset="0"/>
+              </a:rPr>
+              <a:t>, </a:t>
+            </a:r>
+            <a:r>
+              <a:rPr lang="en-US" dirty="0" err="1">
+                <a:solidFill>
+                  <a:prstClr val="black"/>
+                </a:solidFill>
+                <a:latin typeface="Courier New" pitchFamily="49" charset="0"/>
+                <a:cs typeface="Courier New" pitchFamily="49" charset="0"/>
+              </a:rPr>
+              <a:t>block_nr</a:t>
+            </a:r>
+            <a:r>
+              <a:rPr lang="en-US" dirty="0">
+                <a:solidFill>
+                  <a:prstClr val="black"/>
+                </a:solidFill>
+                <a:latin typeface="Courier New" pitchFamily="49" charset="0"/>
+                <a:cs typeface="Courier New" pitchFamily="49" charset="0"/>
+              </a:rPr>
+              <a:t>)</a:t>
+            </a:r>
+          </a:p>
+          <a:p>
+            <a:r>
+              <a:rPr lang="en-US" dirty="0">
+                <a:solidFill>
+                  <a:prstClr val="black"/>
+                </a:solidFill>
+                <a:latin typeface="Courier New" pitchFamily="49" charset="0"/>
+                <a:cs typeface="Courier New" pitchFamily="49" charset="0"/>
+              </a:rPr>
+              <a:t>15           </a:t>
+            </a:r>
+            <a:r>
+              <a:rPr lang="en-US" dirty="0" err="1">
+                <a:solidFill>
+                  <a:prstClr val="black"/>
+                </a:solidFill>
+                <a:latin typeface="Courier New" pitchFamily="49" charset="0"/>
+                <a:cs typeface="Courier New" pitchFamily="49" charset="0"/>
+              </a:rPr>
+              <a:t>text_node</a:t>
+            </a:r>
+            <a:r>
+              <a:rPr lang="en-US" dirty="0">
+                <a:solidFill>
+                  <a:prstClr val="black"/>
+                </a:solidFill>
+                <a:latin typeface="Courier New" pitchFamily="49" charset="0"/>
+                <a:cs typeface="Courier New" pitchFamily="49" charset="0"/>
+              </a:rPr>
+              <a:t> = </a:t>
+            </a:r>
+            <a:r>
+              <a:rPr lang="en-US" dirty="0" err="1">
+                <a:solidFill>
+                  <a:prstClr val="black"/>
+                </a:solidFill>
+                <a:latin typeface="Courier New" pitchFamily="49" charset="0"/>
+                <a:cs typeface="Courier New" pitchFamily="49" charset="0"/>
+              </a:rPr>
+              <a:t>doc.createTextNode</a:t>
+            </a:r>
+            <a:r>
+              <a:rPr lang="en-US" dirty="0">
+                <a:solidFill>
+                  <a:prstClr val="black"/>
+                </a:solidFill>
+                <a:latin typeface="Courier New" pitchFamily="49" charset="0"/>
+                <a:cs typeface="Courier New" pitchFamily="49" charset="0"/>
+              </a:rPr>
+              <a:t>(text)</a:t>
+            </a:r>
+          </a:p>
+          <a:p>
+            <a:r>
+              <a:rPr lang="en-US" dirty="0">
+                <a:solidFill>
+                  <a:prstClr val="black"/>
+                </a:solidFill>
+                <a:latin typeface="Courier New" pitchFamily="49" charset="0"/>
+                <a:cs typeface="Courier New" pitchFamily="49" charset="0"/>
+              </a:rPr>
+              <a:t>16           </a:t>
+            </a:r>
+            <a:r>
+              <a:rPr lang="en-US" dirty="0" err="1">
+                <a:solidFill>
+                  <a:prstClr val="black"/>
+                </a:solidFill>
+                <a:latin typeface="Courier New" pitchFamily="49" charset="0"/>
+                <a:cs typeface="Courier New" pitchFamily="49" charset="0"/>
+              </a:rPr>
+              <a:t>item.appendChild</a:t>
+            </a:r>
+            <a:r>
+              <a:rPr lang="en-US" dirty="0">
+                <a:solidFill>
+                  <a:prstClr val="black"/>
+                </a:solidFill>
+                <a:latin typeface="Courier New" pitchFamily="49" charset="0"/>
+                <a:cs typeface="Courier New" pitchFamily="49" charset="0"/>
+              </a:rPr>
+              <a:t>(</a:t>
+            </a:r>
+            <a:r>
+              <a:rPr lang="en-US" dirty="0" err="1">
+                <a:solidFill>
+                  <a:prstClr val="black"/>
+                </a:solidFill>
+                <a:latin typeface="Courier New" pitchFamily="49" charset="0"/>
+                <a:cs typeface="Courier New" pitchFamily="49" charset="0"/>
+              </a:rPr>
+              <a:t>text_node</a:t>
+            </a:r>
+            <a:r>
+              <a:rPr lang="en-US" dirty="0">
+                <a:solidFill>
+                  <a:prstClr val="black"/>
+                </a:solidFill>
+                <a:latin typeface="Courier New" pitchFamily="49" charset="0"/>
+                <a:cs typeface="Courier New" pitchFamily="49" charset="0"/>
+              </a:rPr>
+              <a:t>)</a:t>
+            </a:r>
+          </a:p>
+          <a:p>
+            <a:r>
+              <a:rPr lang="en-US" dirty="0">
+                <a:solidFill>
+                  <a:prstClr val="black"/>
+                </a:solidFill>
+                <a:latin typeface="Courier New" pitchFamily="49" charset="0"/>
+                <a:cs typeface="Courier New" pitchFamily="49" charset="0"/>
+              </a:rPr>
+              <a:t>17           </a:t>
+            </a:r>
+            <a:r>
+              <a:rPr lang="en-US" dirty="0" err="1">
+                <a:solidFill>
+                  <a:prstClr val="black"/>
+                </a:solidFill>
+                <a:latin typeface="Courier New" pitchFamily="49" charset="0"/>
+                <a:cs typeface="Courier New" pitchFamily="49" charset="0"/>
+              </a:rPr>
+              <a:t>block.appendChild</a:t>
+            </a:r>
+            <a:r>
+              <a:rPr lang="en-US" dirty="0">
+                <a:solidFill>
+                  <a:prstClr val="black"/>
+                </a:solidFill>
+                <a:latin typeface="Courier New" pitchFamily="49" charset="0"/>
+                <a:cs typeface="Courier New" pitchFamily="49" charset="0"/>
+              </a:rPr>
+              <a:t>(item)</a:t>
+            </a:r>
+          </a:p>
+          <a:p>
+            <a:r>
+              <a:rPr lang="en-US" dirty="0">
+                <a:solidFill>
+                  <a:prstClr val="black"/>
+                </a:solidFill>
+                <a:latin typeface="Courier New" pitchFamily="49" charset="0"/>
+                <a:cs typeface="Courier New" pitchFamily="49" charset="0"/>
+              </a:rPr>
+              <a:t>18   print(</a:t>
+            </a:r>
+            <a:r>
+              <a:rPr lang="en-US" dirty="0" err="1">
+                <a:solidFill>
+                  <a:prstClr val="black"/>
+                </a:solidFill>
+                <a:latin typeface="Courier New" pitchFamily="49" charset="0"/>
+                <a:cs typeface="Courier New" pitchFamily="49" charset="0"/>
+              </a:rPr>
+              <a:t>doc.toprettyxml</a:t>
+            </a:r>
+            <a:r>
+              <a:rPr lang="en-US" dirty="0">
+                <a:solidFill>
+                  <a:prstClr val="black"/>
+                </a:solidFill>
+                <a:latin typeface="Courier New" pitchFamily="49" charset="0"/>
+                <a:cs typeface="Courier New" pitchFamily="49" charset="0"/>
+              </a:rPr>
+              <a:t>(indent='  '))</a:t>
+            </a:r>
+          </a:p>
+        </p:txBody>
+      </p:sp>
+      <p:sp>
+        <p:nvSpPr>
+          <p:cNvPr id="3" name="Slide Number Placeholder 2"/>
+          <p:cNvSpPr>
+            <a:spLocks noGrp="1"/>
+          </p:cNvSpPr>
+          <p:nvPr>
+            <p:ph type="sldNum" sz="quarter" idx="12"/>
+          </p:nvPr>
+        </p:nvSpPr>
+        <p:spPr/>
+        <p:txBody>
+          <a:bodyPr/>
+          <a:lstStyle/>
+          <a:p>
+            <a:fld id="{5A209D72-2E9D-49B0-8977-41DCCC66C0BB}" type="slidenum">
+              <a:rPr lang="nl-BE">
+                <a:solidFill>
+                  <a:prstClr val="black">
+                    <a:tint val="75000"/>
+                  </a:prstClr>
+                </a:solidFill>
+                <a:latin typeface="Calibri"/>
+              </a:rPr>
+              <a:pPr/>
+              <a:t>26</a:t>
+            </a:fld>
+            <a:endParaRPr lang="nl-BE">
+              <a:solidFill>
+                <a:prstClr val="black">
+                  <a:tint val="75000"/>
+                </a:prstClr>
+              </a:solidFill>
+              <a:latin typeface="Calibri"/>
+            </a:endParaRPr>
+          </a:p>
+        </p:txBody>
+      </p:sp>
+    </p:spTree>
+    <p:extLst>
+      <p:ext uri="{BB962C8B-B14F-4D97-AF65-F5344CB8AC3E}">
+        <p14:creationId xmlns:p14="http://schemas.microsoft.com/office/powerpoint/2010/main" val="1324044320"/>
+      </p:ext>
+    </p:extLst>
+  </p:cSld>
+  <p:clrMapOvr>
+    <a:masterClrMapping/>
+  </p:clrMapOvr>
+  <p:timing>
+    <p:tnLst>
+      <p:par>
+        <p:cTn id="1" dur="indefinite" restart="never" nodeType="tmRoot"/>
+      </p:par>
+    </p:tnLst>
+  </p:timing>
+</p:sld>
+</file>
+
+<file path=ppt/slides/slide27.xml><?xml version="1.0" encoding="utf-8"?>
+<p:sld xmlns:a="http://schemas.openxmlformats.org/drawingml/2006/main" xmlns:r="http://schemas.openxmlformats.org/officeDocument/2006/relationships" xmlns:p="http://schemas.openxmlformats.org/presentationml/2006/main">
+  <p:cSld>
+    <p:spTree>
+      <p:nvGrpSpPr>
+        <p:cNvPr id="1" name=""/>
+        <p:cNvGrpSpPr/>
+        <p:nvPr/>
+      </p:nvGrpSpPr>
+      <p:grpSpPr>
+        <a:xfrm>
+          <a:off x="0" y="0"/>
+          <a:ext cx="0" cy="0"/>
+          <a:chOff x="0" y="0"/>
+          <a:chExt cx="0" cy="0"/>
+        </a:xfrm>
+      </p:grpSpPr>
+      <p:sp>
+        <p:nvSpPr>
+          <p:cNvPr id="2" name="Title 1"/>
+          <p:cNvSpPr>
+            <a:spLocks noGrp="1"/>
+          </p:cNvSpPr>
+          <p:nvPr>
+            <p:ph type="title"/>
+          </p:nvPr>
+        </p:nvSpPr>
+        <p:spPr/>
+        <p:txBody>
+          <a:bodyPr/>
+          <a:lstStyle/>
+          <a:p>
+            <a:r>
+              <a:rPr lang="en-US" dirty="0" smtClean="0"/>
               <a:t>File system operations:</a:t>
             </a:r>
             <a:br>
@@ -17551,7 +17863,7 @@
                 <a:latin typeface="Calibri"/>
               </a:rPr>
               <a:pPr/>
-              <a:t>26</a:t>
+              <a:t>27</a:t>
             </a:fld>
             <a:endParaRPr lang="nl-BE">
               <a:solidFill>
@@ -17584,7 +17896,7 @@
 </p:sld>
 </file>
 
-<file path=ppt/slides/slide27.xml><?xml version="1.0" encoding="utf-8"?>
+<file path=ppt/slides/slide28.xml><?xml version="1.0" encoding="utf-8"?>
 <p:sld xmlns:a="http://schemas.openxmlformats.org/drawingml/2006/main" xmlns:r="http://schemas.openxmlformats.org/officeDocument/2006/relationships" xmlns:p="http://schemas.openxmlformats.org/presentationml/2006/main">
   <p:cSld>
     <p:spTree>
@@ -18364,7 +18676,7 @@
                 <a:latin typeface="Calibri"/>
               </a:rPr>
               <a:pPr/>
-              <a:t>27</a:t>
+              <a:t>28</a:t>
             </a:fld>
             <a:endParaRPr lang="nl-BE">
               <a:solidFill>
@@ -18397,7 +18709,7 @@
 </p:sld>
 </file>
 
-<file path=ppt/slides/slide28.xml><?xml version="1.0" encoding="utf-8"?>
+<file path=ppt/slides/slide29.xml><?xml version="1.0" encoding="utf-8"?>
 <p:sld xmlns:a="http://schemas.openxmlformats.org/drawingml/2006/main" xmlns:r="http://schemas.openxmlformats.org/officeDocument/2006/relationships" xmlns:p="http://schemas.openxmlformats.org/presentationml/2006/main">
   <p:cSld>
     <p:spTree>
@@ -19498,7 +19810,7 @@
                 <a:latin typeface="Calibri"/>
               </a:rPr>
               <a:pPr/>
-              <a:t>28</a:t>
+              <a:t>29</a:t>
             </a:fld>
             <a:endParaRPr lang="nl-BE">
               <a:solidFill>
@@ -19648,7 +19960,7 @@
 </p:sld>
 </file>
 
-<file path=ppt/slides/slide29.xml><?xml version="1.0" encoding="utf-8"?>
+<file path=ppt/slides/slide3.xml><?xml version="1.0" encoding="utf-8"?>
 <p:sld xmlns:a="http://schemas.openxmlformats.org/drawingml/2006/main" xmlns:r="http://schemas.openxmlformats.org/officeDocument/2006/relationships" xmlns:p="http://schemas.openxmlformats.org/presentationml/2006/main">
   <p:cSld>
     <p:spTree>
@@ -19682,6 +19994,766 @@
           <a:p>
             <a:r>
               <a:rPr lang="en-US" dirty="0" smtClean="0"/>
+              <a:t>Typographical conventions I</a:t>
+            </a:r>
+            <a:endParaRPr lang="nl-BE" dirty="0"/>
+          </a:p>
+        </p:txBody>
+      </p:sp>
+      <p:sp>
+        <p:nvSpPr>
+          <p:cNvPr id="3" name="Content Placeholder 2"/>
+          <p:cNvSpPr>
+            <a:spLocks noGrp="1"/>
+          </p:cNvSpPr>
+          <p:nvPr>
+            <p:ph idx="1"/>
+          </p:nvPr>
+        </p:nvSpPr>
+        <p:spPr/>
+        <p:txBody>
+          <a:bodyPr/>
+          <a:lstStyle/>
+          <a:p>
+            <a:r>
+              <a:rPr lang="en-US" dirty="0" smtClean="0"/>
+              <a:t>Shell commands are rendered as</a:t>
+            </a:r>
+          </a:p>
+          <a:p>
+            <a:endParaRPr lang="en-US" dirty="0"/>
+          </a:p>
+          <a:p>
+            <a:pPr lvl="1"/>
+            <a:r>
+              <a:rPr lang="en-US" dirty="0" smtClean="0"/>
+              <a:t>Do </a:t>
+            </a:r>
+            <a:r>
+              <a:rPr lang="en-US" i="1" dirty="0" smtClean="0"/>
+              <a:t>not</a:t>
+            </a:r>
+            <a:r>
+              <a:rPr lang="en-US" dirty="0" smtClean="0"/>
+              <a:t> type </a:t>
+            </a:r>
+            <a:r>
+              <a:rPr lang="en-US" dirty="0" smtClean="0">
+                <a:latin typeface="Courier New" pitchFamily="49" charset="0"/>
+                <a:cs typeface="Courier New" pitchFamily="49" charset="0"/>
+              </a:rPr>
+              <a:t>$</a:t>
+            </a:r>
+            <a:r>
+              <a:rPr lang="en-US" dirty="0" smtClean="0"/>
+              <a:t>, it represents your shell prompt!</a:t>
+            </a:r>
+          </a:p>
+          <a:p>
+            <a:r>
+              <a:rPr lang="en-US" dirty="0" smtClean="0"/>
+              <a:t>Python shell commands are rendered as</a:t>
+            </a:r>
+          </a:p>
+          <a:p>
+            <a:endParaRPr lang="en-US" dirty="0" smtClean="0"/>
+          </a:p>
+          <a:p>
+            <a:pPr lvl="1"/>
+            <a:r>
+              <a:rPr lang="en-US" dirty="0" smtClean="0"/>
+              <a:t>Do </a:t>
+            </a:r>
+            <a:r>
+              <a:rPr lang="en-US" i="1" dirty="0" smtClean="0"/>
+              <a:t>not</a:t>
+            </a:r>
+            <a:r>
+              <a:rPr lang="en-US" dirty="0" smtClean="0"/>
+              <a:t> type </a:t>
+            </a:r>
+            <a:r>
+              <a:rPr lang="en-US" dirty="0">
+                <a:latin typeface="Courier New" panose="02070309020205020404" pitchFamily="49" charset="0"/>
+                <a:cs typeface="Courier New" panose="02070309020205020404" pitchFamily="49" charset="0"/>
+              </a:rPr>
+              <a:t>&gt;&gt;&gt;</a:t>
+            </a:r>
+            <a:r>
+              <a:rPr lang="en-US" dirty="0" smtClean="0"/>
+              <a:t>, it represents the prompt!</a:t>
+            </a:r>
+          </a:p>
+          <a:p>
+            <a:r>
+              <a:rPr lang="en-US" dirty="0" err="1" smtClean="0"/>
+              <a:t>iPython</a:t>
+            </a:r>
+            <a:r>
+              <a:rPr lang="en-US" dirty="0" smtClean="0"/>
+              <a:t> interpreter is rendered as</a:t>
+            </a:r>
+          </a:p>
+        </p:txBody>
+      </p:sp>
+      <p:sp>
+        <p:nvSpPr>
+          <p:cNvPr id="4" name="TextBox 3"/>
+          <p:cNvSpPr txBox="1"/>
+          <p:nvPr/>
+        </p:nvSpPr>
+        <p:spPr>
+          <a:xfrm>
+            <a:off x="2855641" y="2321241"/>
+            <a:ext cx="5423280" cy="369332"/>
+          </a:xfrm>
+          <a:prstGeom prst="rect">
+            <a:avLst/>
+          </a:prstGeom>
+          <a:solidFill>
+            <a:schemeClr val="tx1"/>
+          </a:solidFill>
+          <a:ln>
+            <a:solidFill>
+              <a:schemeClr val="tx1"/>
+            </a:solidFill>
+          </a:ln>
+        </p:spPr>
+        <p:txBody>
+          <a:bodyPr wrap="none" rtlCol="0">
+            <a:spAutoFit/>
+          </a:bodyPr>
+          <a:lstStyle/>
+          <a:p>
+            <a:r>
+              <a:rPr lang="en-US" b="1" dirty="0">
+                <a:solidFill>
+                  <a:schemeClr val="bg1"/>
+                </a:solidFill>
+                <a:latin typeface="Courier New" pitchFamily="49" charset="0"/>
+                <a:cs typeface="Courier New" pitchFamily="49" charset="0"/>
+              </a:rPr>
+              <a:t>$  python  –m </a:t>
+            </a:r>
+            <a:r>
+              <a:rPr lang="en-US" b="1" dirty="0" err="1">
+                <a:solidFill>
+                  <a:schemeClr val="bg1"/>
+                </a:solidFill>
+                <a:latin typeface="Courier New" pitchFamily="49" charset="0"/>
+                <a:cs typeface="Courier New" pitchFamily="49" charset="0"/>
+              </a:rPr>
+              <a:t>doctest</a:t>
+            </a:r>
+            <a:r>
+              <a:rPr lang="en-US" b="1" dirty="0">
+                <a:solidFill>
+                  <a:schemeClr val="bg1"/>
+                </a:solidFill>
+                <a:latin typeface="Courier New" pitchFamily="49" charset="0"/>
+                <a:cs typeface="Courier New" pitchFamily="49" charset="0"/>
+              </a:rPr>
+              <a:t>  data_parsing.py</a:t>
+            </a:r>
+            <a:endParaRPr lang="nl-BE" b="1" dirty="0">
+              <a:solidFill>
+                <a:schemeClr val="bg1"/>
+              </a:solidFill>
+              <a:latin typeface="Courier New" pitchFamily="49" charset="0"/>
+              <a:cs typeface="Courier New" pitchFamily="49" charset="0"/>
+            </a:endParaRPr>
+          </a:p>
+        </p:txBody>
+      </p:sp>
+      <p:sp>
+        <p:nvSpPr>
+          <p:cNvPr id="5" name="Slide Number Placeholder 4"/>
+          <p:cNvSpPr>
+            <a:spLocks noGrp="1"/>
+          </p:cNvSpPr>
+          <p:nvPr>
+            <p:ph type="sldNum" sz="quarter" idx="12"/>
+          </p:nvPr>
+        </p:nvSpPr>
+        <p:spPr/>
+        <p:txBody>
+          <a:bodyPr/>
+          <a:lstStyle/>
+          <a:p>
+            <a:fld id="{BB52A05A-A776-4391-ACD7-D6BC34D3145C}" type="slidenum">
+              <a:rPr lang="nl-BE" smtClean="0"/>
+              <a:t>3</a:t>
+            </a:fld>
+            <a:endParaRPr lang="nl-BE"/>
+          </a:p>
+        </p:txBody>
+      </p:sp>
+      <p:sp>
+        <p:nvSpPr>
+          <p:cNvPr id="8" name="TextBox 7"/>
+          <p:cNvSpPr txBox="1"/>
+          <p:nvPr/>
+        </p:nvSpPr>
+        <p:spPr>
+          <a:xfrm>
+            <a:off x="2855640" y="3733551"/>
+            <a:ext cx="5423280" cy="369332"/>
+          </a:xfrm>
+          <a:prstGeom prst="rect">
+            <a:avLst/>
+          </a:prstGeom>
+          <a:solidFill>
+            <a:schemeClr val="tx1"/>
+          </a:solidFill>
+          <a:ln>
+            <a:solidFill>
+              <a:schemeClr val="tx1"/>
+            </a:solidFill>
+          </a:ln>
+        </p:spPr>
+        <p:txBody>
+          <a:bodyPr wrap="none" rtlCol="0">
+            <a:spAutoFit/>
+          </a:bodyPr>
+          <a:lstStyle/>
+          <a:p>
+            <a:r>
+              <a:rPr lang="en-US" b="1" dirty="0">
+                <a:solidFill>
+                  <a:schemeClr val="bg1"/>
+                </a:solidFill>
+                <a:latin typeface="Courier New" pitchFamily="49" charset="0"/>
+                <a:cs typeface="Courier New" pitchFamily="49" charset="0"/>
+              </a:rPr>
+              <a:t>&gt;&gt;&gt;  names = 'bob </a:t>
+            </a:r>
+            <a:r>
+              <a:rPr lang="en-US" b="1" dirty="0" err="1">
+                <a:solidFill>
+                  <a:schemeClr val="bg1"/>
+                </a:solidFill>
+                <a:latin typeface="Courier New" pitchFamily="49" charset="0"/>
+                <a:cs typeface="Courier New" pitchFamily="49" charset="0"/>
+              </a:rPr>
+              <a:t>alice</a:t>
+            </a:r>
+            <a:r>
+              <a:rPr lang="en-US" b="1" dirty="0">
+                <a:solidFill>
+                  <a:schemeClr val="bg1"/>
+                </a:solidFill>
+                <a:latin typeface="Courier New" pitchFamily="49" charset="0"/>
+                <a:cs typeface="Courier New" pitchFamily="49" charset="0"/>
+              </a:rPr>
+              <a:t> </a:t>
+            </a:r>
+            <a:r>
+              <a:rPr lang="en-US" b="1" dirty="0" err="1">
+                <a:solidFill>
+                  <a:schemeClr val="bg1"/>
+                </a:solidFill>
+                <a:latin typeface="Courier New" pitchFamily="49" charset="0"/>
+                <a:cs typeface="Courier New" pitchFamily="49" charset="0"/>
+              </a:rPr>
+              <a:t>carol'.split</a:t>
+            </a:r>
+            <a:r>
+              <a:rPr lang="en-US" b="1" dirty="0">
+                <a:solidFill>
+                  <a:schemeClr val="bg1"/>
+                </a:solidFill>
+                <a:latin typeface="Courier New" pitchFamily="49" charset="0"/>
+                <a:cs typeface="Courier New" pitchFamily="49" charset="0"/>
+              </a:rPr>
+              <a:t>()</a:t>
+            </a:r>
+            <a:endParaRPr lang="nl-BE" b="1" dirty="0">
+              <a:solidFill>
+                <a:schemeClr val="bg1"/>
+              </a:solidFill>
+              <a:latin typeface="Courier New" pitchFamily="49" charset="0"/>
+              <a:cs typeface="Courier New" pitchFamily="49" charset="0"/>
+            </a:endParaRPr>
+          </a:p>
+        </p:txBody>
+      </p:sp>
+      <p:sp>
+        <p:nvSpPr>
+          <p:cNvPr id="9" name="TextBox 8"/>
+          <p:cNvSpPr txBox="1"/>
+          <p:nvPr/>
+        </p:nvSpPr>
+        <p:spPr>
+          <a:xfrm>
+            <a:off x="2855640" y="5137548"/>
+            <a:ext cx="5836854" cy="369332"/>
+          </a:xfrm>
+          <a:prstGeom prst="rect">
+            <a:avLst/>
+          </a:prstGeom>
+          <a:solidFill>
+            <a:schemeClr val="tx1"/>
+          </a:solidFill>
+          <a:ln>
+            <a:solidFill>
+              <a:schemeClr val="tx1"/>
+            </a:solidFill>
+          </a:ln>
+        </p:spPr>
+        <p:txBody>
+          <a:bodyPr wrap="none" rtlCol="0">
+            <a:spAutoFit/>
+          </a:bodyPr>
+          <a:lstStyle/>
+          <a:p>
+            <a:r>
+              <a:rPr lang="en-US" b="1" dirty="0">
+                <a:solidFill>
+                  <a:schemeClr val="accent3">
+                    <a:lumMod val="75000"/>
+                  </a:schemeClr>
+                </a:solidFill>
+                <a:latin typeface="Courier New" pitchFamily="49" charset="0"/>
+                <a:cs typeface="Courier New" pitchFamily="49" charset="0"/>
+              </a:rPr>
+              <a:t>In[3]:</a:t>
+            </a:r>
+            <a:r>
+              <a:rPr lang="en-US" b="1" dirty="0">
+                <a:solidFill>
+                  <a:schemeClr val="bg1"/>
+                </a:solidFill>
+                <a:latin typeface="Courier New" pitchFamily="49" charset="0"/>
+                <a:cs typeface="Courier New" pitchFamily="49" charset="0"/>
+              </a:rPr>
+              <a:t>  names = 'bob </a:t>
+            </a:r>
+            <a:r>
+              <a:rPr lang="en-US" b="1" dirty="0" err="1">
+                <a:solidFill>
+                  <a:schemeClr val="bg1"/>
+                </a:solidFill>
+                <a:latin typeface="Courier New" pitchFamily="49" charset="0"/>
+                <a:cs typeface="Courier New" pitchFamily="49" charset="0"/>
+              </a:rPr>
+              <a:t>alice</a:t>
+            </a:r>
+            <a:r>
+              <a:rPr lang="en-US" b="1" dirty="0">
+                <a:solidFill>
+                  <a:schemeClr val="bg1"/>
+                </a:solidFill>
+                <a:latin typeface="Courier New" pitchFamily="49" charset="0"/>
+                <a:cs typeface="Courier New" pitchFamily="49" charset="0"/>
+              </a:rPr>
+              <a:t> </a:t>
+            </a:r>
+            <a:r>
+              <a:rPr lang="en-US" b="1" dirty="0" err="1">
+                <a:solidFill>
+                  <a:schemeClr val="bg1"/>
+                </a:solidFill>
+                <a:latin typeface="Courier New" pitchFamily="49" charset="0"/>
+                <a:cs typeface="Courier New" pitchFamily="49" charset="0"/>
+              </a:rPr>
+              <a:t>carol'.split</a:t>
+            </a:r>
+            <a:r>
+              <a:rPr lang="en-US" b="1" dirty="0">
+                <a:solidFill>
+                  <a:schemeClr val="bg1"/>
+                </a:solidFill>
+                <a:latin typeface="Courier New" pitchFamily="49" charset="0"/>
+                <a:cs typeface="Courier New" pitchFamily="49" charset="0"/>
+              </a:rPr>
+              <a:t>()</a:t>
+            </a:r>
+            <a:endParaRPr lang="nl-BE" b="1" dirty="0">
+              <a:solidFill>
+                <a:schemeClr val="bg1"/>
+              </a:solidFill>
+              <a:latin typeface="Courier New" pitchFamily="49" charset="0"/>
+              <a:cs typeface="Courier New" pitchFamily="49" charset="0"/>
+            </a:endParaRPr>
+          </a:p>
+        </p:txBody>
+      </p:sp>
+    </p:spTree>
+    <p:extLst>
+      <p:ext uri="{BB962C8B-B14F-4D97-AF65-F5344CB8AC3E}">
+        <p14:creationId xmlns:p14="http://schemas.microsoft.com/office/powerpoint/2010/main" val="1000462373"/>
+      </p:ext>
+    </p:extLst>
+  </p:cSld>
+  <p:clrMapOvr>
+    <a:masterClrMapping/>
+  </p:clrMapOvr>
+  <p:timing>
+    <p:tnLst>
+      <p:par>
+        <p:cTn id="1" dur="indefinite" restart="never" nodeType="tmRoot">
+          <p:childTnLst>
+            <p:seq concurrent="1" nextAc="seek">
+              <p:cTn id="2" dur="indefinite" nodeType="mainSeq">
+                <p:childTnLst>
+                  <p:par>
+                    <p:cTn id="3" fill="hold">
+                      <p:stCondLst>
+                        <p:cond delay="indefinite"/>
+                        <p:cond evt="onBegin" delay="0">
+                          <p:tn val="2"/>
+                        </p:cond>
+                      </p:stCondLst>
+                      <p:childTnLst>
+                        <p:par>
+                          <p:cTn id="4" fill="hold">
+                            <p:stCondLst>
+                              <p:cond delay="0"/>
+                            </p:stCondLst>
+                            <p:childTnLst>
+                              <p:par>
+                                <p:cTn id="5" presetID="1" presetClass="entr" presetSubtype="0" fill="hold" grpId="0" nodeType="withEffect">
+                                  <p:stCondLst>
+                                    <p:cond delay="0"/>
+                                  </p:stCondLst>
+                                  <p:childTnLst>
+                                    <p:set>
+                                      <p:cBhvr>
+                                        <p:cTn id="6" dur="1" fill="hold">
+                                          <p:stCondLst>
+                                            <p:cond delay="0"/>
+                                          </p:stCondLst>
+                                        </p:cTn>
+                                        <p:tgtEl>
+                                          <p:spTgt spid="3">
+                                            <p:txEl>
+                                              <p:pRg st="0" end="0"/>
+                                            </p:txEl>
+                                          </p:spTgt>
+                                        </p:tgtEl>
+                                        <p:attrNameLst>
+                                          <p:attrName>style.visibility</p:attrName>
+                                        </p:attrNameLst>
+                                      </p:cBhvr>
+                                      <p:to>
+                                        <p:strVal val="visible"/>
+                                      </p:to>
+                                    </p:set>
+                                  </p:childTnLst>
+                                </p:cTn>
+                              </p:par>
+                              <p:par>
+                                <p:cTn id="7" presetID="1" presetClass="entr" presetSubtype="0" fill="hold" grpId="0" nodeType="withEffect">
+                                  <p:stCondLst>
+                                    <p:cond delay="0"/>
+                                  </p:stCondLst>
+                                  <p:childTnLst>
+                                    <p:set>
+                                      <p:cBhvr>
+                                        <p:cTn id="8" dur="1" fill="hold">
+                                          <p:stCondLst>
+                                            <p:cond delay="0"/>
+                                          </p:stCondLst>
+                                        </p:cTn>
+                                        <p:tgtEl>
+                                          <p:spTgt spid="4"/>
+                                        </p:tgtEl>
+                                        <p:attrNameLst>
+                                          <p:attrName>style.visibility</p:attrName>
+                                        </p:attrNameLst>
+                                      </p:cBhvr>
+                                      <p:to>
+                                        <p:strVal val="visible"/>
+                                      </p:to>
+                                    </p:set>
+                                  </p:childTnLst>
+                                </p:cTn>
+                              </p:par>
+                              <p:par>
+                                <p:cTn id="9" presetID="1" presetClass="entr" presetSubtype="0" fill="hold" grpId="0" nodeType="withEffect">
+                                  <p:stCondLst>
+                                    <p:cond delay="0"/>
+                                  </p:stCondLst>
+                                  <p:childTnLst>
+                                    <p:set>
+                                      <p:cBhvr>
+                                        <p:cTn id="10" dur="1" fill="hold">
+                                          <p:stCondLst>
+                                            <p:cond delay="0"/>
+                                          </p:stCondLst>
+                                        </p:cTn>
+                                        <p:tgtEl>
+                                          <p:spTgt spid="3">
+                                            <p:txEl>
+                                              <p:pRg st="2" end="2"/>
+                                            </p:txEl>
+                                          </p:spTgt>
+                                        </p:tgtEl>
+                                        <p:attrNameLst>
+                                          <p:attrName>style.visibility</p:attrName>
+                                        </p:attrNameLst>
+                                      </p:cBhvr>
+                                      <p:to>
+                                        <p:strVal val="visible"/>
+                                      </p:to>
+                                    </p:set>
+                                  </p:childTnLst>
+                                </p:cTn>
+                              </p:par>
+                            </p:childTnLst>
+                          </p:cTn>
+                        </p:par>
+                      </p:childTnLst>
+                    </p:cTn>
+                  </p:par>
+                  <p:par>
+                    <p:cTn id="11" fill="hold">
+                      <p:stCondLst>
+                        <p:cond delay="indefinite"/>
+                      </p:stCondLst>
+                      <p:childTnLst>
+                        <p:par>
+                          <p:cTn id="12" fill="hold">
+                            <p:stCondLst>
+                              <p:cond delay="0"/>
+                            </p:stCondLst>
+                            <p:childTnLst>
+                              <p:par>
+                                <p:cTn id="13" presetID="1" presetClass="entr" presetSubtype="0" fill="hold" grpId="0" nodeType="clickEffect">
+                                  <p:stCondLst>
+                                    <p:cond delay="0"/>
+                                  </p:stCondLst>
+                                  <p:childTnLst>
+                                    <p:set>
+                                      <p:cBhvr>
+                                        <p:cTn id="14" dur="1" fill="hold">
+                                          <p:stCondLst>
+                                            <p:cond delay="0"/>
+                                          </p:stCondLst>
+                                        </p:cTn>
+                                        <p:tgtEl>
+                                          <p:spTgt spid="3">
+                                            <p:txEl>
+                                              <p:pRg st="3" end="3"/>
+                                            </p:txEl>
+                                          </p:spTgt>
+                                        </p:tgtEl>
+                                        <p:attrNameLst>
+                                          <p:attrName>style.visibility</p:attrName>
+                                        </p:attrNameLst>
+                                      </p:cBhvr>
+                                      <p:to>
+                                        <p:strVal val="visible"/>
+                                      </p:to>
+                                    </p:set>
+                                  </p:childTnLst>
+                                </p:cTn>
+                              </p:par>
+                              <p:par>
+                                <p:cTn id="15" presetID="1" presetClass="entr" presetSubtype="0" fill="hold" grpId="0" nodeType="withEffect">
+                                  <p:stCondLst>
+                                    <p:cond delay="0"/>
+                                  </p:stCondLst>
+                                  <p:childTnLst>
+                                    <p:set>
+                                      <p:cBhvr>
+                                        <p:cTn id="16" dur="1" fill="hold">
+                                          <p:stCondLst>
+                                            <p:cond delay="0"/>
+                                          </p:stCondLst>
+                                        </p:cTn>
+                                        <p:tgtEl>
+                                          <p:spTgt spid="8"/>
+                                        </p:tgtEl>
+                                        <p:attrNameLst>
+                                          <p:attrName>style.visibility</p:attrName>
+                                        </p:attrNameLst>
+                                      </p:cBhvr>
+                                      <p:to>
+                                        <p:strVal val="visible"/>
+                                      </p:to>
+                                    </p:set>
+                                  </p:childTnLst>
+                                </p:cTn>
+                              </p:par>
+                              <p:par>
+                                <p:cTn id="17" presetID="1" presetClass="entr" presetSubtype="0" fill="hold" grpId="0" nodeType="withEffect">
+                                  <p:stCondLst>
+                                    <p:cond delay="0"/>
+                                  </p:stCondLst>
+                                  <p:childTnLst>
+                                    <p:set>
+                                      <p:cBhvr>
+                                        <p:cTn id="18" dur="1" fill="hold">
+                                          <p:stCondLst>
+                                            <p:cond delay="0"/>
+                                          </p:stCondLst>
+                                        </p:cTn>
+                                        <p:tgtEl>
+                                          <p:spTgt spid="3">
+                                            <p:txEl>
+                                              <p:pRg st="5" end="5"/>
+                                            </p:txEl>
+                                          </p:spTgt>
+                                        </p:tgtEl>
+                                        <p:attrNameLst>
+                                          <p:attrName>style.visibility</p:attrName>
+                                        </p:attrNameLst>
+                                      </p:cBhvr>
+                                      <p:to>
+                                        <p:strVal val="visible"/>
+                                      </p:to>
+                                    </p:set>
+                                  </p:childTnLst>
+                                </p:cTn>
+                              </p:par>
+                            </p:childTnLst>
+                          </p:cTn>
+                        </p:par>
+                      </p:childTnLst>
+                    </p:cTn>
+                  </p:par>
+                  <p:par>
+                    <p:cTn id="19" fill="hold">
+                      <p:stCondLst>
+                        <p:cond delay="indefinite"/>
+                      </p:stCondLst>
+                      <p:childTnLst>
+                        <p:par>
+                          <p:cTn id="20" fill="hold">
+                            <p:stCondLst>
+                              <p:cond delay="0"/>
+                            </p:stCondLst>
+                            <p:childTnLst>
+                              <p:par>
+                                <p:cTn id="21" presetID="1" presetClass="entr" presetSubtype="0" fill="hold" grpId="0" nodeType="clickEffect">
+                                  <p:stCondLst>
+                                    <p:cond delay="0"/>
+                                  </p:stCondLst>
+                                  <p:childTnLst>
+                                    <p:set>
+                                      <p:cBhvr>
+                                        <p:cTn id="22" dur="1" fill="hold">
+                                          <p:stCondLst>
+                                            <p:cond delay="0"/>
+                                          </p:stCondLst>
+                                        </p:cTn>
+                                        <p:tgtEl>
+                                          <p:spTgt spid="3">
+                                            <p:txEl>
+                                              <p:pRg st="6" end="6"/>
+                                            </p:txEl>
+                                          </p:spTgt>
+                                        </p:tgtEl>
+                                        <p:attrNameLst>
+                                          <p:attrName>style.visibility</p:attrName>
+                                        </p:attrNameLst>
+                                      </p:cBhvr>
+                                      <p:to>
+                                        <p:strVal val="visible"/>
+                                      </p:to>
+                                    </p:set>
+                                  </p:childTnLst>
+                                </p:cTn>
+                              </p:par>
+                              <p:par>
+                                <p:cTn id="23" presetID="1" presetClass="entr" presetSubtype="0" fill="hold" grpId="0" nodeType="withEffect">
+                                  <p:stCondLst>
+                                    <p:cond delay="0"/>
+                                  </p:stCondLst>
+                                  <p:childTnLst>
+                                    <p:set>
+                                      <p:cBhvr>
+                                        <p:cTn id="24" dur="1" fill="hold">
+                                          <p:stCondLst>
+                                            <p:cond delay="0"/>
+                                          </p:stCondLst>
+                                        </p:cTn>
+                                        <p:tgtEl>
+                                          <p:spTgt spid="9"/>
+                                        </p:tgtEl>
+                                        <p:attrNameLst>
+                                          <p:attrName>style.visibility</p:attrName>
+                                        </p:attrNameLst>
+                                      </p:cBhvr>
+                                      <p:to>
+                                        <p:strVal val="visible"/>
+                                      </p:to>
+                                    </p:set>
+                                  </p:childTnLst>
+                                </p:cTn>
+                              </p:par>
+                            </p:childTnLst>
+                          </p:cTn>
+                        </p:par>
+                      </p:childTnLst>
+                    </p:cTn>
+                  </p:par>
+                </p:childTnLst>
+              </p:cTn>
+              <p:prevCondLst>
+                <p:cond evt="onPrev" delay="0">
+                  <p:tgtEl>
+                    <p:sldTgt/>
+                  </p:tgtEl>
+                </p:cond>
+              </p:prevCondLst>
+              <p:nextCondLst>
+                <p:cond evt="onNext" delay="0">
+                  <p:tgtEl>
+                    <p:sldTgt/>
+                  </p:tgtEl>
+                </p:cond>
+              </p:nextCondLst>
+            </p:seq>
+          </p:childTnLst>
+        </p:cTn>
+      </p:par>
+    </p:tnLst>
+    <p:bldLst>
+      <p:bldP spid="3" grpId="0" uiExpand="1" build="p"/>
+      <p:bldP spid="4" grpId="0" animBg="1"/>
+      <p:bldP spid="8" grpId="0" animBg="1"/>
+      <p:bldP spid="9" grpId="0" animBg="1"/>
+    </p:bldLst>
+  </p:timing>
+</p:sld>
+</file>
+
+<file path=ppt/slides/slide30.xml><?xml version="1.0" encoding="utf-8"?>
+<p:sld xmlns:a="http://schemas.openxmlformats.org/drawingml/2006/main" xmlns:r="http://schemas.openxmlformats.org/officeDocument/2006/relationships" xmlns:p="http://schemas.openxmlformats.org/presentationml/2006/main">
+  <p:cSld>
+    <p:spTree>
+      <p:nvGrpSpPr>
+        <p:cNvPr id="1" name=""/>
+        <p:cNvGrpSpPr/>
+        <p:nvPr/>
+      </p:nvGrpSpPr>
+      <p:grpSpPr>
+        <a:xfrm>
+          <a:off x="0" y="0"/>
+          <a:ext cx="0" cy="0"/>
+          <a:chOff x="0" y="0"/>
+          <a:chExt cx="0" cy="0"/>
+        </a:xfrm>
+      </p:grpSpPr>
+      <p:sp>
+        <p:nvSpPr>
+          <p:cNvPr id="2" name="Title 1"/>
+          <p:cNvSpPr>
+            <a:spLocks noGrp="1"/>
+          </p:cNvSpPr>
+          <p:nvPr>
+            <p:ph type="title"/>
+          </p:nvPr>
+        </p:nvSpPr>
+        <p:spPr/>
+        <p:txBody>
+          <a:bodyPr/>
+          <a:lstStyle/>
+          <a:p>
+            <a:r>
+              <a:rPr lang="en-US" dirty="0" smtClean="0"/>
               <a:t>Path operations</a:t>
             </a:r>
             <a:endParaRPr lang="en-US" dirty="0"/>
@@ -20218,7 +21290,7 @@
                 <a:latin typeface="Calibri"/>
               </a:rPr>
               <a:pPr/>
-              <a:t>29</a:t>
+              <a:t>30</a:t>
             </a:fld>
             <a:endParaRPr lang="nl-BE">
               <a:solidFill>
@@ -20816,7 +21888,7 @@
 </p:sld>
 </file>
 
-<file path=ppt/slides/slide3.xml><?xml version="1.0" encoding="utf-8"?>
+<file path=ppt/slides/slide31.xml><?xml version="1.0" encoding="utf-8"?>
 <p:sld xmlns:a="http://schemas.openxmlformats.org/drawingml/2006/main" xmlns:r="http://schemas.openxmlformats.org/officeDocument/2006/relationships" xmlns:p="http://schemas.openxmlformats.org/presentationml/2006/main">
   <p:cSld>
     <p:spTree>
@@ -20850,766 +21922,6 @@
           <a:p>
             <a:r>
               <a:rPr lang="en-US" dirty="0" smtClean="0"/>
-              <a:t>Typographical conventions I</a:t>
-            </a:r>
-            <a:endParaRPr lang="nl-BE" dirty="0"/>
-          </a:p>
-        </p:txBody>
-      </p:sp>
-      <p:sp>
-        <p:nvSpPr>
-          <p:cNvPr id="3" name="Content Placeholder 2"/>
-          <p:cNvSpPr>
-            <a:spLocks noGrp="1"/>
-          </p:cNvSpPr>
-          <p:nvPr>
-            <p:ph idx="1"/>
-          </p:nvPr>
-        </p:nvSpPr>
-        <p:spPr/>
-        <p:txBody>
-          <a:bodyPr/>
-          <a:lstStyle/>
-          <a:p>
-            <a:r>
-              <a:rPr lang="en-US" dirty="0" smtClean="0"/>
-              <a:t>Shell commands are rendered as</a:t>
-            </a:r>
-          </a:p>
-          <a:p>
-            <a:endParaRPr lang="en-US" dirty="0"/>
-          </a:p>
-          <a:p>
-            <a:pPr lvl="1"/>
-            <a:r>
-              <a:rPr lang="en-US" dirty="0" smtClean="0"/>
-              <a:t>Do </a:t>
-            </a:r>
-            <a:r>
-              <a:rPr lang="en-US" i="1" dirty="0" smtClean="0"/>
-              <a:t>not</a:t>
-            </a:r>
-            <a:r>
-              <a:rPr lang="en-US" dirty="0" smtClean="0"/>
-              <a:t> type </a:t>
-            </a:r>
-            <a:r>
-              <a:rPr lang="en-US" dirty="0" smtClean="0">
-                <a:latin typeface="Courier New" pitchFamily="49" charset="0"/>
-                <a:cs typeface="Courier New" pitchFamily="49" charset="0"/>
-              </a:rPr>
-              <a:t>$</a:t>
-            </a:r>
-            <a:r>
-              <a:rPr lang="en-US" dirty="0" smtClean="0"/>
-              <a:t>, it represents your shell prompt!</a:t>
-            </a:r>
-          </a:p>
-          <a:p>
-            <a:r>
-              <a:rPr lang="en-US" dirty="0" smtClean="0"/>
-              <a:t>Python shell commands are rendered as</a:t>
-            </a:r>
-          </a:p>
-          <a:p>
-            <a:endParaRPr lang="en-US" dirty="0" smtClean="0"/>
-          </a:p>
-          <a:p>
-            <a:pPr lvl="1"/>
-            <a:r>
-              <a:rPr lang="en-US" dirty="0" smtClean="0"/>
-              <a:t>Do </a:t>
-            </a:r>
-            <a:r>
-              <a:rPr lang="en-US" i="1" dirty="0" smtClean="0"/>
-              <a:t>not</a:t>
-            </a:r>
-            <a:r>
-              <a:rPr lang="en-US" dirty="0" smtClean="0"/>
-              <a:t> type </a:t>
-            </a:r>
-            <a:r>
-              <a:rPr lang="en-US" dirty="0">
-                <a:latin typeface="Courier New" panose="02070309020205020404" pitchFamily="49" charset="0"/>
-                <a:cs typeface="Courier New" panose="02070309020205020404" pitchFamily="49" charset="0"/>
-              </a:rPr>
-              <a:t>&gt;&gt;&gt;</a:t>
-            </a:r>
-            <a:r>
-              <a:rPr lang="en-US" dirty="0" smtClean="0"/>
-              <a:t>, it represents the prompt!</a:t>
-            </a:r>
-          </a:p>
-          <a:p>
-            <a:r>
-              <a:rPr lang="en-US" dirty="0" err="1" smtClean="0"/>
-              <a:t>iPython</a:t>
-            </a:r>
-            <a:r>
-              <a:rPr lang="en-US" dirty="0" smtClean="0"/>
-              <a:t> interpreter is rendered as</a:t>
-            </a:r>
-          </a:p>
-        </p:txBody>
-      </p:sp>
-      <p:sp>
-        <p:nvSpPr>
-          <p:cNvPr id="4" name="TextBox 3"/>
-          <p:cNvSpPr txBox="1"/>
-          <p:nvPr/>
-        </p:nvSpPr>
-        <p:spPr>
-          <a:xfrm>
-            <a:off x="2855641" y="2321241"/>
-            <a:ext cx="5423280" cy="369332"/>
-          </a:xfrm>
-          <a:prstGeom prst="rect">
-            <a:avLst/>
-          </a:prstGeom>
-          <a:solidFill>
-            <a:schemeClr val="tx1"/>
-          </a:solidFill>
-          <a:ln>
-            <a:solidFill>
-              <a:schemeClr val="tx1"/>
-            </a:solidFill>
-          </a:ln>
-        </p:spPr>
-        <p:txBody>
-          <a:bodyPr wrap="none" rtlCol="0">
-            <a:spAutoFit/>
-          </a:bodyPr>
-          <a:lstStyle/>
-          <a:p>
-            <a:r>
-              <a:rPr lang="en-US" b="1" dirty="0">
-                <a:solidFill>
-                  <a:schemeClr val="bg1"/>
-                </a:solidFill>
-                <a:latin typeface="Courier New" pitchFamily="49" charset="0"/>
-                <a:cs typeface="Courier New" pitchFamily="49" charset="0"/>
-              </a:rPr>
-              <a:t>$  python  –m </a:t>
-            </a:r>
-            <a:r>
-              <a:rPr lang="en-US" b="1" dirty="0" err="1">
-                <a:solidFill>
-                  <a:schemeClr val="bg1"/>
-                </a:solidFill>
-                <a:latin typeface="Courier New" pitchFamily="49" charset="0"/>
-                <a:cs typeface="Courier New" pitchFamily="49" charset="0"/>
-              </a:rPr>
-              <a:t>doctest</a:t>
-            </a:r>
-            <a:r>
-              <a:rPr lang="en-US" b="1" dirty="0">
-                <a:solidFill>
-                  <a:schemeClr val="bg1"/>
-                </a:solidFill>
-                <a:latin typeface="Courier New" pitchFamily="49" charset="0"/>
-                <a:cs typeface="Courier New" pitchFamily="49" charset="0"/>
-              </a:rPr>
-              <a:t>  data_parsing.py</a:t>
-            </a:r>
-            <a:endParaRPr lang="nl-BE" b="1" dirty="0">
-              <a:solidFill>
-                <a:schemeClr val="bg1"/>
-              </a:solidFill>
-              <a:latin typeface="Courier New" pitchFamily="49" charset="0"/>
-              <a:cs typeface="Courier New" pitchFamily="49" charset="0"/>
-            </a:endParaRPr>
-          </a:p>
-        </p:txBody>
-      </p:sp>
-      <p:sp>
-        <p:nvSpPr>
-          <p:cNvPr id="5" name="Slide Number Placeholder 4"/>
-          <p:cNvSpPr>
-            <a:spLocks noGrp="1"/>
-          </p:cNvSpPr>
-          <p:nvPr>
-            <p:ph type="sldNum" sz="quarter" idx="12"/>
-          </p:nvPr>
-        </p:nvSpPr>
-        <p:spPr/>
-        <p:txBody>
-          <a:bodyPr/>
-          <a:lstStyle/>
-          <a:p>
-            <a:fld id="{BB52A05A-A776-4391-ACD7-D6BC34D3145C}" type="slidenum">
-              <a:rPr lang="nl-BE" smtClean="0"/>
-              <a:t>3</a:t>
-            </a:fld>
-            <a:endParaRPr lang="nl-BE"/>
-          </a:p>
-        </p:txBody>
-      </p:sp>
-      <p:sp>
-        <p:nvSpPr>
-          <p:cNvPr id="8" name="TextBox 7"/>
-          <p:cNvSpPr txBox="1"/>
-          <p:nvPr/>
-        </p:nvSpPr>
-        <p:spPr>
-          <a:xfrm>
-            <a:off x="2855640" y="3733551"/>
-            <a:ext cx="5423280" cy="369332"/>
-          </a:xfrm>
-          <a:prstGeom prst="rect">
-            <a:avLst/>
-          </a:prstGeom>
-          <a:solidFill>
-            <a:schemeClr val="tx1"/>
-          </a:solidFill>
-          <a:ln>
-            <a:solidFill>
-              <a:schemeClr val="tx1"/>
-            </a:solidFill>
-          </a:ln>
-        </p:spPr>
-        <p:txBody>
-          <a:bodyPr wrap="none" rtlCol="0">
-            <a:spAutoFit/>
-          </a:bodyPr>
-          <a:lstStyle/>
-          <a:p>
-            <a:r>
-              <a:rPr lang="en-US" b="1" dirty="0">
-                <a:solidFill>
-                  <a:schemeClr val="bg1"/>
-                </a:solidFill>
-                <a:latin typeface="Courier New" pitchFamily="49" charset="0"/>
-                <a:cs typeface="Courier New" pitchFamily="49" charset="0"/>
-              </a:rPr>
-              <a:t>&gt;&gt;&gt;  names = 'bob </a:t>
-            </a:r>
-            <a:r>
-              <a:rPr lang="en-US" b="1" dirty="0" err="1">
-                <a:solidFill>
-                  <a:schemeClr val="bg1"/>
-                </a:solidFill>
-                <a:latin typeface="Courier New" pitchFamily="49" charset="0"/>
-                <a:cs typeface="Courier New" pitchFamily="49" charset="0"/>
-              </a:rPr>
-              <a:t>alice</a:t>
-            </a:r>
-            <a:r>
-              <a:rPr lang="en-US" b="1" dirty="0">
-                <a:solidFill>
-                  <a:schemeClr val="bg1"/>
-                </a:solidFill>
-                <a:latin typeface="Courier New" pitchFamily="49" charset="0"/>
-                <a:cs typeface="Courier New" pitchFamily="49" charset="0"/>
-              </a:rPr>
-              <a:t> </a:t>
-            </a:r>
-            <a:r>
-              <a:rPr lang="en-US" b="1" dirty="0" err="1">
-                <a:solidFill>
-                  <a:schemeClr val="bg1"/>
-                </a:solidFill>
-                <a:latin typeface="Courier New" pitchFamily="49" charset="0"/>
-                <a:cs typeface="Courier New" pitchFamily="49" charset="0"/>
-              </a:rPr>
-              <a:t>carol'.split</a:t>
-            </a:r>
-            <a:r>
-              <a:rPr lang="en-US" b="1" dirty="0">
-                <a:solidFill>
-                  <a:schemeClr val="bg1"/>
-                </a:solidFill>
-                <a:latin typeface="Courier New" pitchFamily="49" charset="0"/>
-                <a:cs typeface="Courier New" pitchFamily="49" charset="0"/>
-              </a:rPr>
-              <a:t>()</a:t>
-            </a:r>
-            <a:endParaRPr lang="nl-BE" b="1" dirty="0">
-              <a:solidFill>
-                <a:schemeClr val="bg1"/>
-              </a:solidFill>
-              <a:latin typeface="Courier New" pitchFamily="49" charset="0"/>
-              <a:cs typeface="Courier New" pitchFamily="49" charset="0"/>
-            </a:endParaRPr>
-          </a:p>
-        </p:txBody>
-      </p:sp>
-      <p:sp>
-        <p:nvSpPr>
-          <p:cNvPr id="9" name="TextBox 8"/>
-          <p:cNvSpPr txBox="1"/>
-          <p:nvPr/>
-        </p:nvSpPr>
-        <p:spPr>
-          <a:xfrm>
-            <a:off x="2855640" y="5137548"/>
-            <a:ext cx="5836854" cy="369332"/>
-          </a:xfrm>
-          <a:prstGeom prst="rect">
-            <a:avLst/>
-          </a:prstGeom>
-          <a:solidFill>
-            <a:schemeClr val="tx1"/>
-          </a:solidFill>
-          <a:ln>
-            <a:solidFill>
-              <a:schemeClr val="tx1"/>
-            </a:solidFill>
-          </a:ln>
-        </p:spPr>
-        <p:txBody>
-          <a:bodyPr wrap="none" rtlCol="0">
-            <a:spAutoFit/>
-          </a:bodyPr>
-          <a:lstStyle/>
-          <a:p>
-            <a:r>
-              <a:rPr lang="en-US" b="1" dirty="0">
-                <a:solidFill>
-                  <a:schemeClr val="accent3">
-                    <a:lumMod val="75000"/>
-                  </a:schemeClr>
-                </a:solidFill>
-                <a:latin typeface="Courier New" pitchFamily="49" charset="0"/>
-                <a:cs typeface="Courier New" pitchFamily="49" charset="0"/>
-              </a:rPr>
-              <a:t>In[3]:</a:t>
-            </a:r>
-            <a:r>
-              <a:rPr lang="en-US" b="1" dirty="0">
-                <a:solidFill>
-                  <a:schemeClr val="bg1"/>
-                </a:solidFill>
-                <a:latin typeface="Courier New" pitchFamily="49" charset="0"/>
-                <a:cs typeface="Courier New" pitchFamily="49" charset="0"/>
-              </a:rPr>
-              <a:t>  names = 'bob </a:t>
-            </a:r>
-            <a:r>
-              <a:rPr lang="en-US" b="1" dirty="0" err="1">
-                <a:solidFill>
-                  <a:schemeClr val="bg1"/>
-                </a:solidFill>
-                <a:latin typeface="Courier New" pitchFamily="49" charset="0"/>
-                <a:cs typeface="Courier New" pitchFamily="49" charset="0"/>
-              </a:rPr>
-              <a:t>alice</a:t>
-            </a:r>
-            <a:r>
-              <a:rPr lang="en-US" b="1" dirty="0">
-                <a:solidFill>
-                  <a:schemeClr val="bg1"/>
-                </a:solidFill>
-                <a:latin typeface="Courier New" pitchFamily="49" charset="0"/>
-                <a:cs typeface="Courier New" pitchFamily="49" charset="0"/>
-              </a:rPr>
-              <a:t> </a:t>
-            </a:r>
-            <a:r>
-              <a:rPr lang="en-US" b="1" dirty="0" err="1">
-                <a:solidFill>
-                  <a:schemeClr val="bg1"/>
-                </a:solidFill>
-                <a:latin typeface="Courier New" pitchFamily="49" charset="0"/>
-                <a:cs typeface="Courier New" pitchFamily="49" charset="0"/>
-              </a:rPr>
-              <a:t>carol'.split</a:t>
-            </a:r>
-            <a:r>
-              <a:rPr lang="en-US" b="1" dirty="0">
-                <a:solidFill>
-                  <a:schemeClr val="bg1"/>
-                </a:solidFill>
-                <a:latin typeface="Courier New" pitchFamily="49" charset="0"/>
-                <a:cs typeface="Courier New" pitchFamily="49" charset="0"/>
-              </a:rPr>
-              <a:t>()</a:t>
-            </a:r>
-            <a:endParaRPr lang="nl-BE" b="1" dirty="0">
-              <a:solidFill>
-                <a:schemeClr val="bg1"/>
-              </a:solidFill>
-              <a:latin typeface="Courier New" pitchFamily="49" charset="0"/>
-              <a:cs typeface="Courier New" pitchFamily="49" charset="0"/>
-            </a:endParaRPr>
-          </a:p>
-        </p:txBody>
-      </p:sp>
-    </p:spTree>
-    <p:extLst>
-      <p:ext uri="{BB962C8B-B14F-4D97-AF65-F5344CB8AC3E}">
-        <p14:creationId xmlns:p14="http://schemas.microsoft.com/office/powerpoint/2010/main" val="1000462373"/>
-      </p:ext>
-    </p:extLst>
-  </p:cSld>
-  <p:clrMapOvr>
-    <a:masterClrMapping/>
-  </p:clrMapOvr>
-  <p:timing>
-    <p:tnLst>
-      <p:par>
-        <p:cTn id="1" dur="indefinite" restart="never" nodeType="tmRoot">
-          <p:childTnLst>
-            <p:seq concurrent="1" nextAc="seek">
-              <p:cTn id="2" dur="indefinite" nodeType="mainSeq">
-                <p:childTnLst>
-                  <p:par>
-                    <p:cTn id="3" fill="hold">
-                      <p:stCondLst>
-                        <p:cond delay="indefinite"/>
-                        <p:cond evt="onBegin" delay="0">
-                          <p:tn val="2"/>
-                        </p:cond>
-                      </p:stCondLst>
-                      <p:childTnLst>
-                        <p:par>
-                          <p:cTn id="4" fill="hold">
-                            <p:stCondLst>
-                              <p:cond delay="0"/>
-                            </p:stCondLst>
-                            <p:childTnLst>
-                              <p:par>
-                                <p:cTn id="5" presetID="1" presetClass="entr" presetSubtype="0" fill="hold" grpId="0" nodeType="withEffect">
-                                  <p:stCondLst>
-                                    <p:cond delay="0"/>
-                                  </p:stCondLst>
-                                  <p:childTnLst>
-                                    <p:set>
-                                      <p:cBhvr>
-                                        <p:cTn id="6" dur="1" fill="hold">
-                                          <p:stCondLst>
-                                            <p:cond delay="0"/>
-                                          </p:stCondLst>
-                                        </p:cTn>
-                                        <p:tgtEl>
-                                          <p:spTgt spid="3">
-                                            <p:txEl>
-                                              <p:pRg st="0" end="0"/>
-                                            </p:txEl>
-                                          </p:spTgt>
-                                        </p:tgtEl>
-                                        <p:attrNameLst>
-                                          <p:attrName>style.visibility</p:attrName>
-                                        </p:attrNameLst>
-                                      </p:cBhvr>
-                                      <p:to>
-                                        <p:strVal val="visible"/>
-                                      </p:to>
-                                    </p:set>
-                                  </p:childTnLst>
-                                </p:cTn>
-                              </p:par>
-                              <p:par>
-                                <p:cTn id="7" presetID="1" presetClass="entr" presetSubtype="0" fill="hold" grpId="0" nodeType="withEffect">
-                                  <p:stCondLst>
-                                    <p:cond delay="0"/>
-                                  </p:stCondLst>
-                                  <p:childTnLst>
-                                    <p:set>
-                                      <p:cBhvr>
-                                        <p:cTn id="8" dur="1" fill="hold">
-                                          <p:stCondLst>
-                                            <p:cond delay="0"/>
-                                          </p:stCondLst>
-                                        </p:cTn>
-                                        <p:tgtEl>
-                                          <p:spTgt spid="4"/>
-                                        </p:tgtEl>
-                                        <p:attrNameLst>
-                                          <p:attrName>style.visibility</p:attrName>
-                                        </p:attrNameLst>
-                                      </p:cBhvr>
-                                      <p:to>
-                                        <p:strVal val="visible"/>
-                                      </p:to>
-                                    </p:set>
-                                  </p:childTnLst>
-                                </p:cTn>
-                              </p:par>
-                              <p:par>
-                                <p:cTn id="9" presetID="1" presetClass="entr" presetSubtype="0" fill="hold" grpId="0" nodeType="withEffect">
-                                  <p:stCondLst>
-                                    <p:cond delay="0"/>
-                                  </p:stCondLst>
-                                  <p:childTnLst>
-                                    <p:set>
-                                      <p:cBhvr>
-                                        <p:cTn id="10" dur="1" fill="hold">
-                                          <p:stCondLst>
-                                            <p:cond delay="0"/>
-                                          </p:stCondLst>
-                                        </p:cTn>
-                                        <p:tgtEl>
-                                          <p:spTgt spid="3">
-                                            <p:txEl>
-                                              <p:pRg st="2" end="2"/>
-                                            </p:txEl>
-                                          </p:spTgt>
-                                        </p:tgtEl>
-                                        <p:attrNameLst>
-                                          <p:attrName>style.visibility</p:attrName>
-                                        </p:attrNameLst>
-                                      </p:cBhvr>
-                                      <p:to>
-                                        <p:strVal val="visible"/>
-                                      </p:to>
-                                    </p:set>
-                                  </p:childTnLst>
-                                </p:cTn>
-                              </p:par>
-                            </p:childTnLst>
-                          </p:cTn>
-                        </p:par>
-                      </p:childTnLst>
-                    </p:cTn>
-                  </p:par>
-                  <p:par>
-                    <p:cTn id="11" fill="hold">
-                      <p:stCondLst>
-                        <p:cond delay="indefinite"/>
-                      </p:stCondLst>
-                      <p:childTnLst>
-                        <p:par>
-                          <p:cTn id="12" fill="hold">
-                            <p:stCondLst>
-                              <p:cond delay="0"/>
-                            </p:stCondLst>
-                            <p:childTnLst>
-                              <p:par>
-                                <p:cTn id="13" presetID="1" presetClass="entr" presetSubtype="0" fill="hold" grpId="0" nodeType="clickEffect">
-                                  <p:stCondLst>
-                                    <p:cond delay="0"/>
-                                  </p:stCondLst>
-                                  <p:childTnLst>
-                                    <p:set>
-                                      <p:cBhvr>
-                                        <p:cTn id="14" dur="1" fill="hold">
-                                          <p:stCondLst>
-                                            <p:cond delay="0"/>
-                                          </p:stCondLst>
-                                        </p:cTn>
-                                        <p:tgtEl>
-                                          <p:spTgt spid="3">
-                                            <p:txEl>
-                                              <p:pRg st="3" end="3"/>
-                                            </p:txEl>
-                                          </p:spTgt>
-                                        </p:tgtEl>
-                                        <p:attrNameLst>
-                                          <p:attrName>style.visibility</p:attrName>
-                                        </p:attrNameLst>
-                                      </p:cBhvr>
-                                      <p:to>
-                                        <p:strVal val="visible"/>
-                                      </p:to>
-                                    </p:set>
-                                  </p:childTnLst>
-                                </p:cTn>
-                              </p:par>
-                              <p:par>
-                                <p:cTn id="15" presetID="1" presetClass="entr" presetSubtype="0" fill="hold" grpId="0" nodeType="withEffect">
-                                  <p:stCondLst>
-                                    <p:cond delay="0"/>
-                                  </p:stCondLst>
-                                  <p:childTnLst>
-                                    <p:set>
-                                      <p:cBhvr>
-                                        <p:cTn id="16" dur="1" fill="hold">
-                                          <p:stCondLst>
-                                            <p:cond delay="0"/>
-                                          </p:stCondLst>
-                                        </p:cTn>
-                                        <p:tgtEl>
-                                          <p:spTgt spid="8"/>
-                                        </p:tgtEl>
-                                        <p:attrNameLst>
-                                          <p:attrName>style.visibility</p:attrName>
-                                        </p:attrNameLst>
-                                      </p:cBhvr>
-                                      <p:to>
-                                        <p:strVal val="visible"/>
-                                      </p:to>
-                                    </p:set>
-                                  </p:childTnLst>
-                                </p:cTn>
-                              </p:par>
-                              <p:par>
-                                <p:cTn id="17" presetID="1" presetClass="entr" presetSubtype="0" fill="hold" grpId="0" nodeType="withEffect">
-                                  <p:stCondLst>
-                                    <p:cond delay="0"/>
-                                  </p:stCondLst>
-                                  <p:childTnLst>
-                                    <p:set>
-                                      <p:cBhvr>
-                                        <p:cTn id="18" dur="1" fill="hold">
-                                          <p:stCondLst>
-                                            <p:cond delay="0"/>
-                                          </p:stCondLst>
-                                        </p:cTn>
-                                        <p:tgtEl>
-                                          <p:spTgt spid="3">
-                                            <p:txEl>
-                                              <p:pRg st="5" end="5"/>
-                                            </p:txEl>
-                                          </p:spTgt>
-                                        </p:tgtEl>
-                                        <p:attrNameLst>
-                                          <p:attrName>style.visibility</p:attrName>
-                                        </p:attrNameLst>
-                                      </p:cBhvr>
-                                      <p:to>
-                                        <p:strVal val="visible"/>
-                                      </p:to>
-                                    </p:set>
-                                  </p:childTnLst>
-                                </p:cTn>
-                              </p:par>
-                            </p:childTnLst>
-                          </p:cTn>
-                        </p:par>
-                      </p:childTnLst>
-                    </p:cTn>
-                  </p:par>
-                  <p:par>
-                    <p:cTn id="19" fill="hold">
-                      <p:stCondLst>
-                        <p:cond delay="indefinite"/>
-                      </p:stCondLst>
-                      <p:childTnLst>
-                        <p:par>
-                          <p:cTn id="20" fill="hold">
-                            <p:stCondLst>
-                              <p:cond delay="0"/>
-                            </p:stCondLst>
-                            <p:childTnLst>
-                              <p:par>
-                                <p:cTn id="21" presetID="1" presetClass="entr" presetSubtype="0" fill="hold" grpId="0" nodeType="clickEffect">
-                                  <p:stCondLst>
-                                    <p:cond delay="0"/>
-                                  </p:stCondLst>
-                                  <p:childTnLst>
-                                    <p:set>
-                                      <p:cBhvr>
-                                        <p:cTn id="22" dur="1" fill="hold">
-                                          <p:stCondLst>
-                                            <p:cond delay="0"/>
-                                          </p:stCondLst>
-                                        </p:cTn>
-                                        <p:tgtEl>
-                                          <p:spTgt spid="3">
-                                            <p:txEl>
-                                              <p:pRg st="6" end="6"/>
-                                            </p:txEl>
-                                          </p:spTgt>
-                                        </p:tgtEl>
-                                        <p:attrNameLst>
-                                          <p:attrName>style.visibility</p:attrName>
-                                        </p:attrNameLst>
-                                      </p:cBhvr>
-                                      <p:to>
-                                        <p:strVal val="visible"/>
-                                      </p:to>
-                                    </p:set>
-                                  </p:childTnLst>
-                                </p:cTn>
-                              </p:par>
-                              <p:par>
-                                <p:cTn id="23" presetID="1" presetClass="entr" presetSubtype="0" fill="hold" grpId="0" nodeType="withEffect">
-                                  <p:stCondLst>
-                                    <p:cond delay="0"/>
-                                  </p:stCondLst>
-                                  <p:childTnLst>
-                                    <p:set>
-                                      <p:cBhvr>
-                                        <p:cTn id="24" dur="1" fill="hold">
-                                          <p:stCondLst>
-                                            <p:cond delay="0"/>
-                                          </p:stCondLst>
-                                        </p:cTn>
-                                        <p:tgtEl>
-                                          <p:spTgt spid="9"/>
-                                        </p:tgtEl>
-                                        <p:attrNameLst>
-                                          <p:attrName>style.visibility</p:attrName>
-                                        </p:attrNameLst>
-                                      </p:cBhvr>
-                                      <p:to>
-                                        <p:strVal val="visible"/>
-                                      </p:to>
-                                    </p:set>
-                                  </p:childTnLst>
-                                </p:cTn>
-                              </p:par>
-                            </p:childTnLst>
-                          </p:cTn>
-                        </p:par>
-                      </p:childTnLst>
-                    </p:cTn>
-                  </p:par>
-                </p:childTnLst>
-              </p:cTn>
-              <p:prevCondLst>
-                <p:cond evt="onPrev" delay="0">
-                  <p:tgtEl>
-                    <p:sldTgt/>
-                  </p:tgtEl>
-                </p:cond>
-              </p:prevCondLst>
-              <p:nextCondLst>
-                <p:cond evt="onNext" delay="0">
-                  <p:tgtEl>
-                    <p:sldTgt/>
-                  </p:tgtEl>
-                </p:cond>
-              </p:nextCondLst>
-            </p:seq>
-          </p:childTnLst>
-        </p:cTn>
-      </p:par>
-    </p:tnLst>
-    <p:bldLst>
-      <p:bldP spid="3" grpId="0" uiExpand="1" build="p"/>
-      <p:bldP spid="4" grpId="0" animBg="1"/>
-      <p:bldP spid="8" grpId="0" animBg="1"/>
-      <p:bldP spid="9" grpId="0" animBg="1"/>
-    </p:bldLst>
-  </p:timing>
-</p:sld>
-</file>
-
-<file path=ppt/slides/slide30.xml><?xml version="1.0" encoding="utf-8"?>
-<p:sld xmlns:a="http://schemas.openxmlformats.org/drawingml/2006/main" xmlns:r="http://schemas.openxmlformats.org/officeDocument/2006/relationships" xmlns:p="http://schemas.openxmlformats.org/presentationml/2006/main">
-  <p:cSld>
-    <p:spTree>
-      <p:nvGrpSpPr>
-        <p:cNvPr id="1" name=""/>
-        <p:cNvGrpSpPr/>
-        <p:nvPr/>
-      </p:nvGrpSpPr>
-      <p:grpSpPr>
-        <a:xfrm>
-          <a:off x="0" y="0"/>
-          <a:ext cx="0" cy="0"/>
-          <a:chOff x="0" y="0"/>
-          <a:chExt cx="0" cy="0"/>
-        </a:xfrm>
-      </p:grpSpPr>
-      <p:sp>
-        <p:nvSpPr>
-          <p:cNvPr id="2" name="Title 1"/>
-          <p:cNvSpPr>
-            <a:spLocks noGrp="1"/>
-          </p:cNvSpPr>
-          <p:nvPr>
-            <p:ph type="title"/>
-          </p:nvPr>
-        </p:nvSpPr>
-        <p:spPr/>
-        <p:txBody>
-          <a:bodyPr/>
-          <a:lstStyle/>
-          <a:p>
-            <a:r>
-              <a:rPr lang="en-US" dirty="0" smtClean="0"/>
               <a:t>File system tests</a:t>
             </a:r>
             <a:endParaRPr lang="en-US" dirty="0"/>
@@ -21984,7 +22296,7 @@
                 <a:latin typeface="Calibri"/>
               </a:rPr>
               <a:pPr/>
-              <a:t>30</a:t>
+              <a:t>31</a:t>
             </a:fld>
             <a:endParaRPr lang="nl-BE">
               <a:solidFill>
@@ -22500,7 +22812,7 @@
 </p:sld>
 </file>
 
-<file path=ppt/slides/slide31.xml><?xml version="1.0" encoding="utf-8"?>
+<file path=ppt/slides/slide32.xml><?xml version="1.0" encoding="utf-8"?>
 <p:sld xmlns:a="http://schemas.openxmlformats.org/drawingml/2006/main" xmlns:r="http://schemas.openxmlformats.org/officeDocument/2006/relationships" xmlns:p="http://schemas.openxmlformats.org/presentationml/2006/main">
   <p:cSld>
     <p:spTree>
@@ -22797,7 +23109,7 @@
                 <a:latin typeface="Calibri"/>
               </a:rPr>
               <a:pPr/>
-              <a:t>31</a:t>
+              <a:t>32</a:t>
             </a:fld>
             <a:endParaRPr lang="nl-BE">
               <a:solidFill>
@@ -23251,7 +23563,7 @@
 </p:sld>
 </file>
 
-<file path=ppt/slides/slide32.xml><?xml version="1.0" encoding="utf-8"?>
+<file path=ppt/slides/slide33.xml><?xml version="1.0" encoding="utf-8"?>
 <p:sld xmlns:a="http://schemas.openxmlformats.org/drawingml/2006/main" xmlns:r="http://schemas.openxmlformats.org/officeDocument/2006/relationships" xmlns:p="http://schemas.openxmlformats.org/presentationml/2006/main">
   <p:cSld>
     <p:spTree>
@@ -23695,7 +24007,7 @@
                 <a:latin typeface="Calibri"/>
               </a:rPr>
               <a:pPr/>
-              <a:t>32</a:t>
+              <a:t>33</a:t>
             </a:fld>
             <a:endParaRPr lang="nl-BE">
               <a:solidFill>
@@ -23845,7 +24157,7 @@
 </p:sld>
 </file>
 
-<file path=ppt/slides/slide33.xml><?xml version="1.0" encoding="utf-8"?>
+<file path=ppt/slides/slide34.xml><?xml version="1.0" encoding="utf-8"?>
 <p:sld xmlns:a="http://schemas.openxmlformats.org/drawingml/2006/main" xmlns:r="http://schemas.openxmlformats.org/officeDocument/2006/relationships" xmlns:p="http://schemas.openxmlformats.org/presentationml/2006/main">
   <p:cSld>
     <p:spTree>
@@ -23995,7 +24307,7 @@
                 <a:latin typeface="Calibri"/>
               </a:rPr>
               <a:pPr/>
-              <a:t>33</a:t>
+              <a:t>34</a:t>
             </a:fld>
             <a:endParaRPr lang="nl-BE">
               <a:solidFill>
@@ -24769,7 +25081,7 @@
 </p:sld>
 </file>
 
-<file path=ppt/slides/slide34.xml><?xml version="1.0" encoding="utf-8"?>
+<file path=ppt/slides/slide35.xml><?xml version="1.0" encoding="utf-8"?>
 <p:sld xmlns:a="http://schemas.openxmlformats.org/drawingml/2006/main" xmlns:r="http://schemas.openxmlformats.org/officeDocument/2006/relationships" xmlns:p="http://schemas.openxmlformats.org/presentationml/2006/main">
   <p:cSld>
     <p:spTree>
@@ -24882,7 +25194,7 @@
                 <a:latin typeface="Calibri"/>
               </a:rPr>
               <a:pPr/>
-              <a:t>34</a:t>
+              <a:t>35</a:t>
             </a:fld>
             <a:endParaRPr lang="nl-BE">
               <a:solidFill>
@@ -24915,7 +25227,7 @@
 </p:sld>
 </file>
 
-<file path=ppt/slides/slide35.xml><?xml version="1.0" encoding="utf-8"?>
+<file path=ppt/slides/slide36.xml><?xml version="1.0" encoding="utf-8"?>
 <p:sld xmlns:a="http://schemas.openxmlformats.org/drawingml/2006/main" xmlns:r="http://schemas.openxmlformats.org/officeDocument/2006/relationships" xmlns:p="http://schemas.openxmlformats.org/presentationml/2006/main">
   <p:cSld>
     <p:spTree>
@@ -25385,7 +25697,7 @@
                 <a:latin typeface="Calibri"/>
               </a:rPr>
               <a:pPr/>
-              <a:t>35</a:t>
+              <a:t>36</a:t>
             </a:fld>
             <a:endParaRPr lang="nl-BE">
               <a:solidFill>
@@ -25833,7 +26145,7 @@
 </p:sld>
 </file>
 
-<file path=ppt/slides/slide36.xml><?xml version="1.0" encoding="utf-8"?>
+<file path=ppt/slides/slide37.xml><?xml version="1.0" encoding="utf-8"?>
 <p:sld xmlns:a="http://schemas.openxmlformats.org/drawingml/2006/main" xmlns:r="http://schemas.openxmlformats.org/officeDocument/2006/relationships" xmlns:p="http://schemas.openxmlformats.org/presentationml/2006/main">
   <p:cSld>
     <p:spTree>
@@ -26828,7 +27140,7 @@
                 <a:latin typeface="Calibri"/>
               </a:rPr>
               <a:pPr/>
-              <a:t>36</a:t>
+              <a:t>37</a:t>
             </a:fld>
             <a:endParaRPr lang="nl-BE">
               <a:solidFill>

</xml_diff>